<commit_message>
update for August 2016 SWC Workshop
</commit_message>
<xml_diff>
--- a/SWC_Python_Intro.pptx
+++ b/SWC_Python_Intro.pptx
@@ -268,7 +268,7 @@
           <a:effectLst/>
           <a:extLst>
             <a:ext uri="{91240B29-F687-4f45-9708-019B960494DF}">
-              <a14:hiddenLine xmlns:a14="http://schemas.microsoft.com/office/drawing/2010/main" xmlns="" w="9360" cap="sq">
+              <a14:hiddenLine xmlns="" xmlns:a14="http://schemas.microsoft.com/office/drawing/2010/main" w="9360" cap="sq">
                 <a:solidFill>
                   <a:srgbClr val="000000"/>
                 </a:solidFill>
@@ -278,7 +278,7 @@
               </a14:hiddenLine>
             </a:ext>
             <a:ext uri="{AF507438-7753-43e0-B8FC-AC1667EBCBE1}">
-              <a14:hiddenEffects xmlns:a14="http://schemas.microsoft.com/office/drawing/2010/main" xmlns="">
+              <a14:hiddenEffects xmlns="" xmlns:a14="http://schemas.microsoft.com/office/drawing/2010/main">
                 <a:effectLst>
                   <a:outerShdw blurRad="63500" dist="38099" dir="2700000" algn="ctr" rotWithShape="0">
                     <a:srgbClr val="000000">
@@ -331,7 +331,7 @@
           <a:effectLst/>
           <a:extLst>
             <a:ext uri="{91240B29-F687-4f45-9708-019B960494DF}">
-              <a14:hiddenLine xmlns:a14="http://schemas.microsoft.com/office/drawing/2010/main" xmlns="" w="9525" cap="flat">
+              <a14:hiddenLine xmlns="" xmlns:a14="http://schemas.microsoft.com/office/drawing/2010/main" w="9525" cap="flat">
                 <a:solidFill>
                   <a:srgbClr val="3465A4"/>
                 </a:solidFill>
@@ -341,7 +341,7 @@
               </a14:hiddenLine>
             </a:ext>
             <a:ext uri="{AF507438-7753-43e0-B8FC-AC1667EBCBE1}">
-              <a14:hiddenEffects xmlns:a14="http://schemas.microsoft.com/office/drawing/2010/main" xmlns="">
+              <a14:hiddenEffects xmlns="" xmlns:a14="http://schemas.microsoft.com/office/drawing/2010/main">
                 <a:effectLst>
                   <a:outerShdw blurRad="63500" dist="38099" dir="2700000" algn="ctr" rotWithShape="0">
                     <a:srgbClr val="000000">
@@ -395,14 +395,14 @@
               <ma14:placeholderFlag xmlns:ma14="http://schemas.microsoft.com/office/mac/drawingml/2011/main" val="1"/>
             </a:ext>
             <a:ext uri="{909E8E84-426E-40dd-AFC4-6F175D3DCCD1}">
-              <a14:hiddenFill xmlns:a14="http://schemas.microsoft.com/office/drawing/2010/main" xmlns="">
+              <a14:hiddenFill xmlns="" xmlns:a14="http://schemas.microsoft.com/office/drawing/2010/main">
                 <a:solidFill>
                   <a:srgbClr val="FFFFFF"/>
                 </a:solidFill>
               </a14:hiddenFill>
             </a:ext>
             <a:ext uri="{91240B29-F687-4f45-9708-019B960494DF}">
-              <a14:hiddenLine xmlns:a14="http://schemas.microsoft.com/office/drawing/2010/main" xmlns="" w="9525" cap="flat">
+              <a14:hiddenLine xmlns="" xmlns:a14="http://schemas.microsoft.com/office/drawing/2010/main" w="9525" cap="flat">
                 <a:solidFill>
                   <a:srgbClr val="3465A4"/>
                 </a:solidFill>
@@ -412,7 +412,7 @@
               </a14:hiddenLine>
             </a:ext>
             <a:ext uri="{AF507438-7753-43e0-B8FC-AC1667EBCBE1}">
-              <a14:hiddenEffects xmlns:a14="http://schemas.microsoft.com/office/drawing/2010/main" xmlns="">
+              <a14:hiddenEffects xmlns="" xmlns:a14="http://schemas.microsoft.com/office/drawing/2010/main">
                 <a:effectLst>
                   <a:outerShdw blurRad="63500" dist="38099" dir="2700000" algn="ctr" rotWithShape="0">
                     <a:schemeClr val="bg2">
@@ -453,14 +453,14 @@
               <ma14:placeholderFlag xmlns:ma14="http://schemas.microsoft.com/office/mac/drawingml/2011/main" val="1"/>
             </a:ext>
             <a:ext uri="{909E8E84-426E-40dd-AFC4-6F175D3DCCD1}">
-              <a14:hiddenFill xmlns:a14="http://schemas.microsoft.com/office/drawing/2010/main" xmlns="">
+              <a14:hiddenFill xmlns="" xmlns:a14="http://schemas.microsoft.com/office/drawing/2010/main">
                 <a:solidFill>
                   <a:srgbClr val="FFFFFF"/>
                 </a:solidFill>
               </a14:hiddenFill>
             </a:ext>
             <a:ext uri="{91240B29-F687-4f45-9708-019B960494DF}">
-              <a14:hiddenLine xmlns:a14="http://schemas.microsoft.com/office/drawing/2010/main" xmlns="" w="9525" cap="flat">
+              <a14:hiddenLine xmlns="" xmlns:a14="http://schemas.microsoft.com/office/drawing/2010/main" w="9525" cap="flat">
                 <a:solidFill>
                   <a:srgbClr val="3465A4"/>
                 </a:solidFill>
@@ -470,7 +470,7 @@
               </a14:hiddenLine>
             </a:ext>
             <a:ext uri="{AF507438-7753-43e0-B8FC-AC1667EBCBE1}">
-              <a14:hiddenEffects xmlns:a14="http://schemas.microsoft.com/office/drawing/2010/main" xmlns="">
+              <a14:hiddenEffects xmlns="" xmlns:a14="http://schemas.microsoft.com/office/drawing/2010/main">
                 <a:effectLst>
                   <a:outerShdw blurRad="63500" dist="38099" dir="2700000" algn="ctr" rotWithShape="0">
                     <a:schemeClr val="bg2">
@@ -518,14 +518,14 @@
           <a:effectLst/>
           <a:extLst>
             <a:ext uri="{909E8E84-426E-40dd-AFC4-6F175D3DCCD1}">
-              <a14:hiddenFill xmlns:a14="http://schemas.microsoft.com/office/drawing/2010/main" xmlns="">
+              <a14:hiddenFill xmlns="" xmlns:a14="http://schemas.microsoft.com/office/drawing/2010/main">
                 <a:solidFill>
                   <a:srgbClr val="FFFFFF"/>
                 </a:solidFill>
               </a14:hiddenFill>
             </a:ext>
             <a:ext uri="{91240B29-F687-4f45-9708-019B960494DF}">
-              <a14:hiddenLine xmlns:a14="http://schemas.microsoft.com/office/drawing/2010/main" xmlns="" w="9525" cap="flat">
+              <a14:hiddenLine xmlns="" xmlns:a14="http://schemas.microsoft.com/office/drawing/2010/main" w="9525" cap="flat">
                 <a:solidFill>
                   <a:srgbClr val="3465A4"/>
                 </a:solidFill>
@@ -535,7 +535,7 @@
               </a14:hiddenLine>
             </a:ext>
             <a:ext uri="{AF507438-7753-43e0-B8FC-AC1667EBCBE1}">
-              <a14:hiddenEffects xmlns:a14="http://schemas.microsoft.com/office/drawing/2010/main" xmlns="">
+              <a14:hiddenEffects xmlns="" xmlns:a14="http://schemas.microsoft.com/office/drawing/2010/main">
                 <a:effectLst>
                   <a:outerShdw blurRad="63500" dist="38099" dir="2700000" algn="ctr" rotWithShape="0">
                     <a:srgbClr val="000000">
@@ -584,14 +584,14 @@
           <a:effectLst/>
           <a:extLst>
             <a:ext uri="{909E8E84-426E-40dd-AFC4-6F175D3DCCD1}">
-              <a14:hiddenFill xmlns:a14="http://schemas.microsoft.com/office/drawing/2010/main" xmlns="">
+              <a14:hiddenFill xmlns="" xmlns:a14="http://schemas.microsoft.com/office/drawing/2010/main">
                 <a:solidFill>
                   <a:srgbClr val="FFFFFF"/>
                 </a:solidFill>
               </a14:hiddenFill>
             </a:ext>
             <a:ext uri="{91240B29-F687-4f45-9708-019B960494DF}">
-              <a14:hiddenLine xmlns:a14="http://schemas.microsoft.com/office/drawing/2010/main" xmlns="" w="9525" cap="flat">
+              <a14:hiddenLine xmlns="" xmlns:a14="http://schemas.microsoft.com/office/drawing/2010/main" w="9525" cap="flat">
                 <a:solidFill>
                   <a:srgbClr val="3465A4"/>
                 </a:solidFill>
@@ -601,7 +601,7 @@
               </a14:hiddenLine>
             </a:ext>
             <a:ext uri="{AF507438-7753-43e0-B8FC-AC1667EBCBE1}">
-              <a14:hiddenEffects xmlns:a14="http://schemas.microsoft.com/office/drawing/2010/main" xmlns="">
+              <a14:hiddenEffects xmlns="" xmlns:a14="http://schemas.microsoft.com/office/drawing/2010/main">
                 <a:effectLst>
                   <a:outerShdw blurRad="63500" dist="38099" dir="2700000" algn="ctr" rotWithShape="0">
                     <a:srgbClr val="000000">
@@ -650,14 +650,14 @@
           <a:effectLst/>
           <a:extLst>
             <a:ext uri="{909E8E84-426E-40dd-AFC4-6F175D3DCCD1}">
-              <a14:hiddenFill xmlns:a14="http://schemas.microsoft.com/office/drawing/2010/main" xmlns="">
+              <a14:hiddenFill xmlns="" xmlns:a14="http://schemas.microsoft.com/office/drawing/2010/main">
                 <a:solidFill>
                   <a:srgbClr val="FFFFFF"/>
                 </a:solidFill>
               </a14:hiddenFill>
             </a:ext>
             <a:ext uri="{91240B29-F687-4f45-9708-019B960494DF}">
-              <a14:hiddenLine xmlns:a14="http://schemas.microsoft.com/office/drawing/2010/main" xmlns="" w="9525" cap="flat">
+              <a14:hiddenLine xmlns="" xmlns:a14="http://schemas.microsoft.com/office/drawing/2010/main" w="9525" cap="flat">
                 <a:solidFill>
                   <a:srgbClr val="3465A4"/>
                 </a:solidFill>
@@ -667,7 +667,7 @@
               </a14:hiddenLine>
             </a:ext>
             <a:ext uri="{AF507438-7753-43e0-B8FC-AC1667EBCBE1}">
-              <a14:hiddenEffects xmlns:a14="http://schemas.microsoft.com/office/drawing/2010/main" xmlns="">
+              <a14:hiddenEffects xmlns="" xmlns:a14="http://schemas.microsoft.com/office/drawing/2010/main">
                 <a:effectLst>
                   <a:outerShdw blurRad="63500" dist="38099" dir="2700000" algn="ctr" rotWithShape="0">
                     <a:srgbClr val="000000">
@@ -721,14 +721,14 @@
               <ma14:placeholderFlag xmlns:ma14="http://schemas.microsoft.com/office/mac/drawingml/2011/main" val="1"/>
             </a:ext>
             <a:ext uri="{909E8E84-426E-40dd-AFC4-6F175D3DCCD1}">
-              <a14:hiddenFill xmlns:a14="http://schemas.microsoft.com/office/drawing/2010/main" xmlns="">
+              <a14:hiddenFill xmlns="" xmlns:a14="http://schemas.microsoft.com/office/drawing/2010/main">
                 <a:solidFill>
                   <a:srgbClr val="FFFFFF"/>
                 </a:solidFill>
               </a14:hiddenFill>
             </a:ext>
             <a:ext uri="{91240B29-F687-4f45-9708-019B960494DF}">
-              <a14:hiddenLine xmlns:a14="http://schemas.microsoft.com/office/drawing/2010/main" xmlns="" w="9525" cap="flat">
+              <a14:hiddenLine xmlns="" xmlns:a14="http://schemas.microsoft.com/office/drawing/2010/main" w="9525" cap="flat">
                 <a:solidFill>
                   <a:srgbClr val="3465A4"/>
                 </a:solidFill>
@@ -738,7 +738,7 @@
               </a14:hiddenLine>
             </a:ext>
             <a:ext uri="{AF507438-7753-43e0-B8FC-AC1667EBCBE1}">
-              <a14:hiddenEffects xmlns:a14="http://schemas.microsoft.com/office/drawing/2010/main" xmlns="">
+              <a14:hiddenEffects xmlns="" xmlns:a14="http://schemas.microsoft.com/office/drawing/2010/main">
                 <a:effectLst>
                   <a:outerShdw blurRad="63500" dist="38099" dir="2700000" algn="ctr" rotWithShape="0">
                     <a:schemeClr val="bg2">
@@ -985,14 +985,14 @@
         <p:spPr>
           <a:extLst>
             <a:ext uri="{909E8E84-426E-40dd-AFC4-6F175D3DCCD1}">
-              <a14:hiddenFill xmlns:a14="http://schemas.microsoft.com/office/drawing/2010/main" xmlns="">
+              <a14:hiddenFill xmlns="" xmlns:a14="http://schemas.microsoft.com/office/drawing/2010/main">
                 <a:solidFill>
                   <a:srgbClr val="FFFFFF"/>
                 </a:solidFill>
               </a14:hiddenFill>
             </a:ext>
             <a:ext uri="{91240B29-F687-4f45-9708-019B960494DF}">
-              <a14:hiddenLine xmlns:a14="http://schemas.microsoft.com/office/drawing/2010/main" xmlns="" w="9525" cap="flat">
+              <a14:hiddenLine xmlns="" xmlns:a14="http://schemas.microsoft.com/office/drawing/2010/main" w="9525" cap="flat">
                 <a:solidFill>
                   <a:srgbClr val="3465A4"/>
                 </a:solidFill>
@@ -1002,7 +1002,7 @@
               </a14:hiddenLine>
             </a:ext>
             <a:ext uri="{AF507438-7753-43e0-B8FC-AC1667EBCBE1}">
-              <a14:hiddenEffects xmlns:a14="http://schemas.microsoft.com/office/drawing/2010/main" xmlns="">
+              <a14:hiddenEffects xmlns="" xmlns:a14="http://schemas.microsoft.com/office/drawing/2010/main">
                 <a:effectLst>
                   <a:outerShdw blurRad="63500" dist="38099" dir="2700000" algn="ctr" rotWithShape="0">
                     <a:schemeClr val="bg2">
@@ -1285,7 +1285,7 @@
           </a:ln>
           <a:extLst>
             <a:ext uri="{AF507438-7753-43e0-B8FC-AC1667EBCBE1}">
-              <a14:hiddenEffects xmlns:a14="http://schemas.microsoft.com/office/drawing/2010/main" xmlns="">
+              <a14:hiddenEffects xmlns="" xmlns:a14="http://schemas.microsoft.com/office/drawing/2010/main">
                 <a:effectLst>
                   <a:outerShdw blurRad="63500" dist="38099" dir="2700000" algn="ctr" rotWithShape="0">
                     <a:srgbClr val="000000">
@@ -1321,14 +1321,14 @@
           <a:effectLst/>
           <a:extLst>
             <a:ext uri="{909E8E84-426E-40dd-AFC4-6F175D3DCCD1}">
-              <a14:hiddenFill xmlns:a14="http://schemas.microsoft.com/office/drawing/2010/main" xmlns="">
+              <a14:hiddenFill xmlns="" xmlns:a14="http://schemas.microsoft.com/office/drawing/2010/main">
                 <a:solidFill>
                   <a:srgbClr val="FFFFFF"/>
                 </a:solidFill>
               </a14:hiddenFill>
             </a:ext>
             <a:ext uri="{91240B29-F687-4f45-9708-019B960494DF}">
-              <a14:hiddenLine xmlns:a14="http://schemas.microsoft.com/office/drawing/2010/main" xmlns="" w="9525" cap="flat">
+              <a14:hiddenLine xmlns="" xmlns:a14="http://schemas.microsoft.com/office/drawing/2010/main" w="9525" cap="flat">
                 <a:solidFill>
                   <a:srgbClr val="3465A4"/>
                 </a:solidFill>
@@ -1338,7 +1338,7 @@
               </a14:hiddenLine>
             </a:ext>
             <a:ext uri="{AF507438-7753-43e0-B8FC-AC1667EBCBE1}">
-              <a14:hiddenEffects xmlns:a14="http://schemas.microsoft.com/office/drawing/2010/main" xmlns="">
+              <a14:hiddenEffects xmlns="" xmlns:a14="http://schemas.microsoft.com/office/drawing/2010/main">
                 <a:effectLst>
                   <a:outerShdw blurRad="63500" dist="38099" dir="2700000" algn="ctr" rotWithShape="0">
                     <a:srgbClr val="000000">
@@ -1443,14 +1443,14 @@
         <p:spPr>
           <a:extLst>
             <a:ext uri="{909E8E84-426E-40dd-AFC4-6F175D3DCCD1}">
-              <a14:hiddenFill xmlns:a14="http://schemas.microsoft.com/office/drawing/2010/main" xmlns="">
+              <a14:hiddenFill xmlns="" xmlns:a14="http://schemas.microsoft.com/office/drawing/2010/main">
                 <a:solidFill>
                   <a:srgbClr val="FFFFFF"/>
                 </a:solidFill>
               </a14:hiddenFill>
             </a:ext>
             <a:ext uri="{91240B29-F687-4f45-9708-019B960494DF}">
-              <a14:hiddenLine xmlns:a14="http://schemas.microsoft.com/office/drawing/2010/main" xmlns="" w="9525" cap="flat">
+              <a14:hiddenLine xmlns="" xmlns:a14="http://schemas.microsoft.com/office/drawing/2010/main" w="9525" cap="flat">
                 <a:solidFill>
                   <a:srgbClr val="3465A4"/>
                 </a:solidFill>
@@ -1460,7 +1460,7 @@
               </a14:hiddenLine>
             </a:ext>
             <a:ext uri="{AF507438-7753-43e0-B8FC-AC1667EBCBE1}">
-              <a14:hiddenEffects xmlns:a14="http://schemas.microsoft.com/office/drawing/2010/main" xmlns="">
+              <a14:hiddenEffects xmlns="" xmlns:a14="http://schemas.microsoft.com/office/drawing/2010/main">
                 <a:effectLst>
                   <a:outerShdw blurRad="63500" dist="38099" dir="2700000" algn="ctr" rotWithShape="0">
                     <a:schemeClr val="bg2">
@@ -1766,14 +1766,14 @@
         <p:spPr>
           <a:extLst>
             <a:ext uri="{909E8E84-426E-40dd-AFC4-6F175D3DCCD1}">
-              <a14:hiddenFill xmlns:a14="http://schemas.microsoft.com/office/drawing/2010/main" xmlns="">
+              <a14:hiddenFill xmlns="" xmlns:a14="http://schemas.microsoft.com/office/drawing/2010/main">
                 <a:solidFill>
                   <a:srgbClr val="FFFFFF"/>
                 </a:solidFill>
               </a14:hiddenFill>
             </a:ext>
             <a:ext uri="{91240B29-F687-4f45-9708-019B960494DF}">
-              <a14:hiddenLine xmlns:a14="http://schemas.microsoft.com/office/drawing/2010/main" xmlns="" w="9525" cap="flat">
+              <a14:hiddenLine xmlns="" xmlns:a14="http://schemas.microsoft.com/office/drawing/2010/main" w="9525" cap="flat">
                 <a:solidFill>
                   <a:srgbClr val="3465A4"/>
                 </a:solidFill>
@@ -1783,7 +1783,7 @@
               </a14:hiddenLine>
             </a:ext>
             <a:ext uri="{AF507438-7753-43e0-B8FC-AC1667EBCBE1}">
-              <a14:hiddenEffects xmlns:a14="http://schemas.microsoft.com/office/drawing/2010/main" xmlns="">
+              <a14:hiddenEffects xmlns="" xmlns:a14="http://schemas.microsoft.com/office/drawing/2010/main">
                 <a:effectLst>
                   <a:outerShdw blurRad="63500" dist="38099" dir="2700000" algn="ctr" rotWithShape="0">
                     <a:schemeClr val="bg2">
@@ -2066,7 +2066,7 @@
           </a:ln>
           <a:extLst>
             <a:ext uri="{AF507438-7753-43e0-B8FC-AC1667EBCBE1}">
-              <a14:hiddenEffects xmlns:a14="http://schemas.microsoft.com/office/drawing/2010/main" xmlns="">
+              <a14:hiddenEffects xmlns="" xmlns:a14="http://schemas.microsoft.com/office/drawing/2010/main">
                 <a:effectLst>
                   <a:outerShdw blurRad="63500" dist="38099" dir="2700000" algn="ctr" rotWithShape="0">
                     <a:srgbClr val="000000">
@@ -2102,14 +2102,14 @@
           <a:effectLst/>
           <a:extLst>
             <a:ext uri="{909E8E84-426E-40dd-AFC4-6F175D3DCCD1}">
-              <a14:hiddenFill xmlns:a14="http://schemas.microsoft.com/office/drawing/2010/main" xmlns="">
+              <a14:hiddenFill xmlns="" xmlns:a14="http://schemas.microsoft.com/office/drawing/2010/main">
                 <a:solidFill>
                   <a:srgbClr val="FFFFFF"/>
                 </a:solidFill>
               </a14:hiddenFill>
             </a:ext>
             <a:ext uri="{91240B29-F687-4f45-9708-019B960494DF}">
-              <a14:hiddenLine xmlns:a14="http://schemas.microsoft.com/office/drawing/2010/main" xmlns="" w="9525" cap="flat">
+              <a14:hiddenLine xmlns="" xmlns:a14="http://schemas.microsoft.com/office/drawing/2010/main" w="9525" cap="flat">
                 <a:solidFill>
                   <a:srgbClr val="3465A4"/>
                 </a:solidFill>
@@ -2119,7 +2119,7 @@
               </a14:hiddenLine>
             </a:ext>
             <a:ext uri="{AF507438-7753-43e0-B8FC-AC1667EBCBE1}">
-              <a14:hiddenEffects xmlns:a14="http://schemas.microsoft.com/office/drawing/2010/main" xmlns="">
+              <a14:hiddenEffects xmlns="" xmlns:a14="http://schemas.microsoft.com/office/drawing/2010/main">
                 <a:effectLst>
                   <a:outerShdw blurRad="63500" dist="38099" dir="2700000" algn="ctr" rotWithShape="0">
                     <a:srgbClr val="000000">
@@ -2196,14 +2196,14 @@
         <p:spPr>
           <a:extLst>
             <a:ext uri="{909E8E84-426E-40dd-AFC4-6F175D3DCCD1}">
-              <a14:hiddenFill xmlns:a14="http://schemas.microsoft.com/office/drawing/2010/main" xmlns="">
+              <a14:hiddenFill xmlns="" xmlns:a14="http://schemas.microsoft.com/office/drawing/2010/main">
                 <a:solidFill>
                   <a:srgbClr val="FFFFFF"/>
                 </a:solidFill>
               </a14:hiddenFill>
             </a:ext>
             <a:ext uri="{91240B29-F687-4f45-9708-019B960494DF}">
-              <a14:hiddenLine xmlns:a14="http://schemas.microsoft.com/office/drawing/2010/main" xmlns="" w="9525" cap="flat">
+              <a14:hiddenLine xmlns="" xmlns:a14="http://schemas.microsoft.com/office/drawing/2010/main" w="9525" cap="flat">
                 <a:solidFill>
                   <a:srgbClr val="3465A4"/>
                 </a:solidFill>
@@ -2213,7 +2213,7 @@
               </a14:hiddenLine>
             </a:ext>
             <a:ext uri="{AF507438-7753-43e0-B8FC-AC1667EBCBE1}">
-              <a14:hiddenEffects xmlns:a14="http://schemas.microsoft.com/office/drawing/2010/main" xmlns="">
+              <a14:hiddenEffects xmlns="" xmlns:a14="http://schemas.microsoft.com/office/drawing/2010/main">
                 <a:effectLst>
                   <a:outerShdw blurRad="63500" dist="38099" dir="2700000" algn="ctr" rotWithShape="0">
                     <a:schemeClr val="bg2">
@@ -2496,7 +2496,7 @@
           </a:ln>
           <a:extLst>
             <a:ext uri="{AF507438-7753-43e0-B8FC-AC1667EBCBE1}">
-              <a14:hiddenEffects xmlns:a14="http://schemas.microsoft.com/office/drawing/2010/main" xmlns="">
+              <a14:hiddenEffects xmlns="" xmlns:a14="http://schemas.microsoft.com/office/drawing/2010/main">
                 <a:effectLst>
                   <a:outerShdw blurRad="63500" dist="38099" dir="2700000" algn="ctr" rotWithShape="0">
                     <a:srgbClr val="000000">
@@ -2532,14 +2532,14 @@
           <a:effectLst/>
           <a:extLst>
             <a:ext uri="{909E8E84-426E-40dd-AFC4-6F175D3DCCD1}">
-              <a14:hiddenFill xmlns:a14="http://schemas.microsoft.com/office/drawing/2010/main" xmlns="">
+              <a14:hiddenFill xmlns="" xmlns:a14="http://schemas.microsoft.com/office/drawing/2010/main">
                 <a:solidFill>
                   <a:srgbClr val="FFFFFF"/>
                 </a:solidFill>
               </a14:hiddenFill>
             </a:ext>
             <a:ext uri="{91240B29-F687-4f45-9708-019B960494DF}">
-              <a14:hiddenLine xmlns:a14="http://schemas.microsoft.com/office/drawing/2010/main" xmlns="" w="9525" cap="flat">
+              <a14:hiddenLine xmlns="" xmlns:a14="http://schemas.microsoft.com/office/drawing/2010/main" w="9525" cap="flat">
                 <a:solidFill>
                   <a:srgbClr val="3465A4"/>
                 </a:solidFill>
@@ -2549,7 +2549,7 @@
               </a14:hiddenLine>
             </a:ext>
             <a:ext uri="{AF507438-7753-43e0-B8FC-AC1667EBCBE1}">
-              <a14:hiddenEffects xmlns:a14="http://schemas.microsoft.com/office/drawing/2010/main" xmlns="">
+              <a14:hiddenEffects xmlns="" xmlns:a14="http://schemas.microsoft.com/office/drawing/2010/main">
                 <a:effectLst>
                   <a:outerShdw blurRad="63500" dist="38099" dir="2700000" algn="ctr" rotWithShape="0">
                     <a:srgbClr val="000000">
@@ -2626,14 +2626,14 @@
         <p:spPr>
           <a:extLst>
             <a:ext uri="{909E8E84-426E-40dd-AFC4-6F175D3DCCD1}">
-              <a14:hiddenFill xmlns:a14="http://schemas.microsoft.com/office/drawing/2010/main" xmlns="">
+              <a14:hiddenFill xmlns="" xmlns:a14="http://schemas.microsoft.com/office/drawing/2010/main">
                 <a:solidFill>
                   <a:srgbClr val="FFFFFF"/>
                 </a:solidFill>
               </a14:hiddenFill>
             </a:ext>
             <a:ext uri="{91240B29-F687-4f45-9708-019B960494DF}">
-              <a14:hiddenLine xmlns:a14="http://schemas.microsoft.com/office/drawing/2010/main" xmlns="" w="9525" cap="flat">
+              <a14:hiddenLine xmlns="" xmlns:a14="http://schemas.microsoft.com/office/drawing/2010/main" w="9525" cap="flat">
                 <a:solidFill>
                   <a:srgbClr val="3465A4"/>
                 </a:solidFill>
@@ -2643,7 +2643,7 @@
               </a14:hiddenLine>
             </a:ext>
             <a:ext uri="{AF507438-7753-43e0-B8FC-AC1667EBCBE1}">
-              <a14:hiddenEffects xmlns:a14="http://schemas.microsoft.com/office/drawing/2010/main" xmlns="">
+              <a14:hiddenEffects xmlns="" xmlns:a14="http://schemas.microsoft.com/office/drawing/2010/main">
                 <a:effectLst>
                   <a:outerShdw blurRad="63500" dist="38099" dir="2700000" algn="ctr" rotWithShape="0">
                     <a:schemeClr val="bg2">
@@ -2926,7 +2926,7 @@
           </a:ln>
           <a:extLst>
             <a:ext uri="{AF507438-7753-43e0-B8FC-AC1667EBCBE1}">
-              <a14:hiddenEffects xmlns:a14="http://schemas.microsoft.com/office/drawing/2010/main" xmlns="">
+              <a14:hiddenEffects xmlns="" xmlns:a14="http://schemas.microsoft.com/office/drawing/2010/main">
                 <a:effectLst>
                   <a:outerShdw blurRad="63500" dist="38099" dir="2700000" algn="ctr" rotWithShape="0">
                     <a:srgbClr val="000000">
@@ -2962,14 +2962,14 @@
           <a:effectLst/>
           <a:extLst>
             <a:ext uri="{909E8E84-426E-40dd-AFC4-6F175D3DCCD1}">
-              <a14:hiddenFill xmlns:a14="http://schemas.microsoft.com/office/drawing/2010/main" xmlns="">
+              <a14:hiddenFill xmlns="" xmlns:a14="http://schemas.microsoft.com/office/drawing/2010/main">
                 <a:solidFill>
                   <a:srgbClr val="FFFFFF"/>
                 </a:solidFill>
               </a14:hiddenFill>
             </a:ext>
             <a:ext uri="{91240B29-F687-4f45-9708-019B960494DF}">
-              <a14:hiddenLine xmlns:a14="http://schemas.microsoft.com/office/drawing/2010/main" xmlns="" w="9525" cap="flat">
+              <a14:hiddenLine xmlns="" xmlns:a14="http://schemas.microsoft.com/office/drawing/2010/main" w="9525" cap="flat">
                 <a:solidFill>
                   <a:srgbClr val="3465A4"/>
                 </a:solidFill>
@@ -2979,7 +2979,7 @@
               </a14:hiddenLine>
             </a:ext>
             <a:ext uri="{AF507438-7753-43e0-B8FC-AC1667EBCBE1}">
-              <a14:hiddenEffects xmlns:a14="http://schemas.microsoft.com/office/drawing/2010/main" xmlns="">
+              <a14:hiddenEffects xmlns="" xmlns:a14="http://schemas.microsoft.com/office/drawing/2010/main">
                 <a:effectLst>
                   <a:outerShdw blurRad="63500" dist="38099" dir="2700000" algn="ctr" rotWithShape="0">
                     <a:srgbClr val="000000">
@@ -3108,14 +3108,14 @@
         <p:spPr>
           <a:extLst>
             <a:ext uri="{909E8E84-426E-40dd-AFC4-6F175D3DCCD1}">
-              <a14:hiddenFill xmlns:a14="http://schemas.microsoft.com/office/drawing/2010/main" xmlns="">
+              <a14:hiddenFill xmlns="" xmlns:a14="http://schemas.microsoft.com/office/drawing/2010/main">
                 <a:solidFill>
                   <a:srgbClr val="FFFFFF"/>
                 </a:solidFill>
               </a14:hiddenFill>
             </a:ext>
             <a:ext uri="{91240B29-F687-4f45-9708-019B960494DF}">
-              <a14:hiddenLine xmlns:a14="http://schemas.microsoft.com/office/drawing/2010/main" xmlns="" w="9525" cap="flat">
+              <a14:hiddenLine xmlns="" xmlns:a14="http://schemas.microsoft.com/office/drawing/2010/main" w="9525" cap="flat">
                 <a:solidFill>
                   <a:srgbClr val="3465A4"/>
                 </a:solidFill>
@@ -3125,7 +3125,7 @@
               </a14:hiddenLine>
             </a:ext>
             <a:ext uri="{AF507438-7753-43e0-B8FC-AC1667EBCBE1}">
-              <a14:hiddenEffects xmlns:a14="http://schemas.microsoft.com/office/drawing/2010/main" xmlns="">
+              <a14:hiddenEffects xmlns="" xmlns:a14="http://schemas.microsoft.com/office/drawing/2010/main">
                 <a:effectLst>
                   <a:outerShdw blurRad="63500" dist="38099" dir="2700000" algn="ctr" rotWithShape="0">
                     <a:schemeClr val="bg2">
@@ -3408,7 +3408,7 @@
           </a:ln>
           <a:extLst>
             <a:ext uri="{AF507438-7753-43e0-B8FC-AC1667EBCBE1}">
-              <a14:hiddenEffects xmlns:a14="http://schemas.microsoft.com/office/drawing/2010/main" xmlns="">
+              <a14:hiddenEffects xmlns="" xmlns:a14="http://schemas.microsoft.com/office/drawing/2010/main">
                 <a:effectLst>
                   <a:outerShdw blurRad="63500" dist="38099" dir="2700000" algn="ctr" rotWithShape="0">
                     <a:srgbClr val="000000">
@@ -3444,14 +3444,14 @@
           <a:effectLst/>
           <a:extLst>
             <a:ext uri="{909E8E84-426E-40dd-AFC4-6F175D3DCCD1}">
-              <a14:hiddenFill xmlns:a14="http://schemas.microsoft.com/office/drawing/2010/main" xmlns="">
+              <a14:hiddenFill xmlns="" xmlns:a14="http://schemas.microsoft.com/office/drawing/2010/main">
                 <a:solidFill>
                   <a:srgbClr val="FFFFFF"/>
                 </a:solidFill>
               </a14:hiddenFill>
             </a:ext>
             <a:ext uri="{91240B29-F687-4f45-9708-019B960494DF}">
-              <a14:hiddenLine xmlns:a14="http://schemas.microsoft.com/office/drawing/2010/main" xmlns="" w="9525" cap="flat">
+              <a14:hiddenLine xmlns="" xmlns:a14="http://schemas.microsoft.com/office/drawing/2010/main" w="9525" cap="flat">
                 <a:solidFill>
                   <a:srgbClr val="3465A4"/>
                 </a:solidFill>
@@ -3461,7 +3461,7 @@
               </a14:hiddenLine>
             </a:ext>
             <a:ext uri="{AF507438-7753-43e0-B8FC-AC1667EBCBE1}">
-              <a14:hiddenEffects xmlns:a14="http://schemas.microsoft.com/office/drawing/2010/main" xmlns="">
+              <a14:hiddenEffects xmlns="" xmlns:a14="http://schemas.microsoft.com/office/drawing/2010/main">
                 <a:effectLst>
                   <a:outerShdw blurRad="63500" dist="38099" dir="2700000" algn="ctr" rotWithShape="0">
                     <a:srgbClr val="000000">
@@ -3538,14 +3538,14 @@
         <p:spPr>
           <a:extLst>
             <a:ext uri="{909E8E84-426E-40dd-AFC4-6F175D3DCCD1}">
-              <a14:hiddenFill xmlns:a14="http://schemas.microsoft.com/office/drawing/2010/main" xmlns="">
+              <a14:hiddenFill xmlns="" xmlns:a14="http://schemas.microsoft.com/office/drawing/2010/main">
                 <a:solidFill>
                   <a:srgbClr val="FFFFFF"/>
                 </a:solidFill>
               </a14:hiddenFill>
             </a:ext>
             <a:ext uri="{91240B29-F687-4f45-9708-019B960494DF}">
-              <a14:hiddenLine xmlns:a14="http://schemas.microsoft.com/office/drawing/2010/main" xmlns="" w="9525" cap="flat">
+              <a14:hiddenLine xmlns="" xmlns:a14="http://schemas.microsoft.com/office/drawing/2010/main" w="9525" cap="flat">
                 <a:solidFill>
                   <a:srgbClr val="3465A4"/>
                 </a:solidFill>
@@ -3555,7 +3555,7 @@
               </a14:hiddenLine>
             </a:ext>
             <a:ext uri="{AF507438-7753-43e0-B8FC-AC1667EBCBE1}">
-              <a14:hiddenEffects xmlns:a14="http://schemas.microsoft.com/office/drawing/2010/main" xmlns="">
+              <a14:hiddenEffects xmlns="" xmlns:a14="http://schemas.microsoft.com/office/drawing/2010/main">
                 <a:effectLst>
                   <a:outerShdw blurRad="63500" dist="38099" dir="2700000" algn="ctr" rotWithShape="0">
                     <a:schemeClr val="bg2">
@@ -3838,7 +3838,7 @@
           </a:ln>
           <a:extLst>
             <a:ext uri="{AF507438-7753-43e0-B8FC-AC1667EBCBE1}">
-              <a14:hiddenEffects xmlns:a14="http://schemas.microsoft.com/office/drawing/2010/main" xmlns="">
+              <a14:hiddenEffects xmlns="" xmlns:a14="http://schemas.microsoft.com/office/drawing/2010/main">
                 <a:effectLst>
                   <a:outerShdw blurRad="63500" dist="38099" dir="2700000" algn="ctr" rotWithShape="0">
                     <a:srgbClr val="000000">
@@ -3874,14 +3874,14 @@
           <a:effectLst/>
           <a:extLst>
             <a:ext uri="{909E8E84-426E-40dd-AFC4-6F175D3DCCD1}">
-              <a14:hiddenFill xmlns:a14="http://schemas.microsoft.com/office/drawing/2010/main" xmlns="">
+              <a14:hiddenFill xmlns="" xmlns:a14="http://schemas.microsoft.com/office/drawing/2010/main">
                 <a:solidFill>
                   <a:srgbClr val="FFFFFF"/>
                 </a:solidFill>
               </a14:hiddenFill>
             </a:ext>
             <a:ext uri="{91240B29-F687-4f45-9708-019B960494DF}">
-              <a14:hiddenLine xmlns:a14="http://schemas.microsoft.com/office/drawing/2010/main" xmlns="" w="9525" cap="flat">
+              <a14:hiddenLine xmlns="" xmlns:a14="http://schemas.microsoft.com/office/drawing/2010/main" w="9525" cap="flat">
                 <a:solidFill>
                   <a:srgbClr val="3465A4"/>
                 </a:solidFill>
@@ -3891,7 +3891,7 @@
               </a14:hiddenLine>
             </a:ext>
             <a:ext uri="{AF507438-7753-43e0-B8FC-AC1667EBCBE1}">
-              <a14:hiddenEffects xmlns:a14="http://schemas.microsoft.com/office/drawing/2010/main" xmlns="">
+              <a14:hiddenEffects xmlns="" xmlns:a14="http://schemas.microsoft.com/office/drawing/2010/main">
                 <a:effectLst>
                   <a:outerShdw blurRad="63500" dist="38099" dir="2700000" algn="ctr" rotWithShape="0">
                     <a:srgbClr val="000000">
@@ -6108,12 +6108,12 @@
             <a:effectLst/>
             <a:extLst>
               <a:ext uri="{909E8E84-426E-40dd-AFC4-6F175D3DCCD1}">
-                <a14:hiddenFill xmlns:a14="http://schemas.microsoft.com/office/drawing/2010/main" xmlns="">
+                <a14:hiddenFill xmlns="" xmlns:a14="http://schemas.microsoft.com/office/drawing/2010/main">
                   <a:noFill/>
                 </a14:hiddenFill>
               </a:ext>
               <a:ext uri="{AF507438-7753-43e0-B8FC-AC1667EBCBE1}">
-                <a14:hiddenEffects xmlns:a14="http://schemas.microsoft.com/office/drawing/2010/main" xmlns="">
+                <a14:hiddenEffects xmlns="" xmlns:a14="http://schemas.microsoft.com/office/drawing/2010/main">
                   <a:effectLst>
                     <a:outerShdw blurRad="63500" dist="38099" dir="2700000" algn="ctr" rotWithShape="0">
                       <a:srgbClr val="000000">
@@ -6167,12 +6167,12 @@
             <a:effectLst/>
             <a:extLst>
               <a:ext uri="{909E8E84-426E-40dd-AFC4-6F175D3DCCD1}">
-                <a14:hiddenFill xmlns:a14="http://schemas.microsoft.com/office/drawing/2010/main" xmlns="">
+                <a14:hiddenFill xmlns="" xmlns:a14="http://schemas.microsoft.com/office/drawing/2010/main">
                   <a:noFill/>
                 </a14:hiddenFill>
               </a:ext>
               <a:ext uri="{AF507438-7753-43e0-B8FC-AC1667EBCBE1}">
-                <a14:hiddenEffects xmlns:a14="http://schemas.microsoft.com/office/drawing/2010/main" xmlns="">
+                <a14:hiddenEffects xmlns="" xmlns:a14="http://schemas.microsoft.com/office/drawing/2010/main">
                   <a:effectLst>
                     <a:outerShdw blurRad="63500" dist="38099" dir="2700000" algn="ctr" rotWithShape="0">
                       <a:srgbClr val="000000">
@@ -6226,12 +6226,12 @@
             <a:effectLst/>
             <a:extLst>
               <a:ext uri="{909E8E84-426E-40dd-AFC4-6F175D3DCCD1}">
-                <a14:hiddenFill xmlns:a14="http://schemas.microsoft.com/office/drawing/2010/main" xmlns="">
+                <a14:hiddenFill xmlns="" xmlns:a14="http://schemas.microsoft.com/office/drawing/2010/main">
                   <a:noFill/>
                 </a14:hiddenFill>
               </a:ext>
               <a:ext uri="{AF507438-7753-43e0-B8FC-AC1667EBCBE1}">
-                <a14:hiddenEffects xmlns:a14="http://schemas.microsoft.com/office/drawing/2010/main" xmlns="">
+                <a14:hiddenEffects xmlns="" xmlns:a14="http://schemas.microsoft.com/office/drawing/2010/main">
                   <a:effectLst>
                     <a:outerShdw blurRad="63500" dist="38099" dir="2700000" algn="ctr" rotWithShape="0">
                       <a:srgbClr val="000000">
@@ -6285,12 +6285,12 @@
             <a:effectLst/>
             <a:extLst>
               <a:ext uri="{909E8E84-426E-40dd-AFC4-6F175D3DCCD1}">
-                <a14:hiddenFill xmlns:a14="http://schemas.microsoft.com/office/drawing/2010/main" xmlns="">
+                <a14:hiddenFill xmlns="" xmlns:a14="http://schemas.microsoft.com/office/drawing/2010/main">
                   <a:noFill/>
                 </a14:hiddenFill>
               </a:ext>
               <a:ext uri="{AF507438-7753-43e0-B8FC-AC1667EBCBE1}">
-                <a14:hiddenEffects xmlns:a14="http://schemas.microsoft.com/office/drawing/2010/main" xmlns="">
+                <a14:hiddenEffects xmlns="" xmlns:a14="http://schemas.microsoft.com/office/drawing/2010/main">
                   <a:effectLst>
                     <a:outerShdw blurRad="63500" dist="38099" dir="2700000" algn="ctr" rotWithShape="0">
                       <a:srgbClr val="000000">
@@ -6344,12 +6344,12 @@
             <a:effectLst/>
             <a:extLst>
               <a:ext uri="{909E8E84-426E-40dd-AFC4-6F175D3DCCD1}">
-                <a14:hiddenFill xmlns:a14="http://schemas.microsoft.com/office/drawing/2010/main" xmlns="">
+                <a14:hiddenFill xmlns="" xmlns:a14="http://schemas.microsoft.com/office/drawing/2010/main">
                   <a:noFill/>
                 </a14:hiddenFill>
               </a:ext>
               <a:ext uri="{AF507438-7753-43e0-B8FC-AC1667EBCBE1}">
-                <a14:hiddenEffects xmlns:a14="http://schemas.microsoft.com/office/drawing/2010/main" xmlns="">
+                <a14:hiddenEffects xmlns="" xmlns:a14="http://schemas.microsoft.com/office/drawing/2010/main">
                   <a:effectLst>
                     <a:outerShdw blurRad="63500" dist="38099" dir="2700000" algn="ctr" rotWithShape="0">
                       <a:srgbClr val="000000">
@@ -6403,12 +6403,12 @@
             <a:effectLst/>
             <a:extLst>
               <a:ext uri="{909E8E84-426E-40dd-AFC4-6F175D3DCCD1}">
-                <a14:hiddenFill xmlns:a14="http://schemas.microsoft.com/office/drawing/2010/main" xmlns="">
+                <a14:hiddenFill xmlns="" xmlns:a14="http://schemas.microsoft.com/office/drawing/2010/main">
                   <a:noFill/>
                 </a14:hiddenFill>
               </a:ext>
               <a:ext uri="{AF507438-7753-43e0-B8FC-AC1667EBCBE1}">
-                <a14:hiddenEffects xmlns:a14="http://schemas.microsoft.com/office/drawing/2010/main" xmlns="">
+                <a14:hiddenEffects xmlns="" xmlns:a14="http://schemas.microsoft.com/office/drawing/2010/main">
                   <a:effectLst>
                     <a:outerShdw blurRad="63500" dist="38099" dir="2700000" algn="ctr" rotWithShape="0">
                       <a:srgbClr val="000000">
@@ -6462,12 +6462,12 @@
             <a:effectLst/>
             <a:extLst>
               <a:ext uri="{909E8E84-426E-40dd-AFC4-6F175D3DCCD1}">
-                <a14:hiddenFill xmlns:a14="http://schemas.microsoft.com/office/drawing/2010/main" xmlns="">
+                <a14:hiddenFill xmlns="" xmlns:a14="http://schemas.microsoft.com/office/drawing/2010/main">
                   <a:noFill/>
                 </a14:hiddenFill>
               </a:ext>
               <a:ext uri="{AF507438-7753-43e0-B8FC-AC1667EBCBE1}">
-                <a14:hiddenEffects xmlns:a14="http://schemas.microsoft.com/office/drawing/2010/main" xmlns="">
+                <a14:hiddenEffects xmlns="" xmlns:a14="http://schemas.microsoft.com/office/drawing/2010/main">
                   <a:effectLst>
                     <a:outerShdw blurRad="63500" dist="38099" dir="2700000" algn="ctr" rotWithShape="0">
                       <a:srgbClr val="000000">
@@ -6517,14 +6517,14 @@
           <a:effectLst/>
           <a:extLst>
             <a:ext uri="{909E8E84-426E-40dd-AFC4-6F175D3DCCD1}">
-              <a14:hiddenFill xmlns:a14="http://schemas.microsoft.com/office/drawing/2010/main" xmlns="">
+              <a14:hiddenFill xmlns="" xmlns:a14="http://schemas.microsoft.com/office/drawing/2010/main">
                 <a:solidFill>
                   <a:srgbClr val="FFFFFF"/>
                 </a:solidFill>
               </a14:hiddenFill>
             </a:ext>
             <a:ext uri="{91240B29-F687-4f45-9708-019B960494DF}">
-              <a14:hiddenLine xmlns:a14="http://schemas.microsoft.com/office/drawing/2010/main" xmlns="" w="9525" cap="flat">
+              <a14:hiddenLine xmlns="" xmlns:a14="http://schemas.microsoft.com/office/drawing/2010/main" w="9525" cap="flat">
                 <a:solidFill>
                   <a:srgbClr val="3465A4"/>
                 </a:solidFill>
@@ -6534,7 +6534,7 @@
               </a14:hiddenLine>
             </a:ext>
             <a:ext uri="{AF507438-7753-43e0-B8FC-AC1667EBCBE1}">
-              <a14:hiddenEffects xmlns:a14="http://schemas.microsoft.com/office/drawing/2010/main" xmlns="">
+              <a14:hiddenEffects xmlns="" xmlns:a14="http://schemas.microsoft.com/office/drawing/2010/main">
                 <a:effectLst>
                   <a:outerShdw blurRad="63500" dist="38099" dir="2700000" algn="ctr" rotWithShape="0">
                     <a:srgbClr val="000000">
@@ -6583,14 +6583,14 @@
           <a:effectLst/>
           <a:extLst>
             <a:ext uri="{909E8E84-426E-40dd-AFC4-6F175D3DCCD1}">
-              <a14:hiddenFill xmlns:a14="http://schemas.microsoft.com/office/drawing/2010/main" xmlns="">
+              <a14:hiddenFill xmlns="" xmlns:a14="http://schemas.microsoft.com/office/drawing/2010/main">
                 <a:solidFill>
                   <a:srgbClr val="FFFFFF"/>
                 </a:solidFill>
               </a14:hiddenFill>
             </a:ext>
             <a:ext uri="{91240B29-F687-4f45-9708-019B960494DF}">
-              <a14:hiddenLine xmlns:a14="http://schemas.microsoft.com/office/drawing/2010/main" xmlns="" w="9525" cap="flat">
+              <a14:hiddenLine xmlns="" xmlns:a14="http://schemas.microsoft.com/office/drawing/2010/main" w="9525" cap="flat">
                 <a:solidFill>
                   <a:srgbClr val="3465A4"/>
                 </a:solidFill>
@@ -6600,7 +6600,7 @@
               </a14:hiddenLine>
             </a:ext>
             <a:ext uri="{AF507438-7753-43e0-B8FC-AC1667EBCBE1}">
-              <a14:hiddenEffects xmlns:a14="http://schemas.microsoft.com/office/drawing/2010/main" xmlns="">
+              <a14:hiddenEffects xmlns="" xmlns:a14="http://schemas.microsoft.com/office/drawing/2010/main">
                 <a:effectLst>
                   <a:outerShdw blurRad="63500" dist="38099" dir="2700000" algn="ctr" rotWithShape="0">
                     <a:srgbClr val="000000">
@@ -6654,14 +6654,14 @@
               <ma14:placeholderFlag xmlns:ma14="http://schemas.microsoft.com/office/mac/drawingml/2011/main" val="1"/>
             </a:ext>
             <a:ext uri="{909E8E84-426E-40dd-AFC4-6F175D3DCCD1}">
-              <a14:hiddenFill xmlns:a14="http://schemas.microsoft.com/office/drawing/2010/main" xmlns="">
+              <a14:hiddenFill xmlns="" xmlns:a14="http://schemas.microsoft.com/office/drawing/2010/main">
                 <a:solidFill>
                   <a:srgbClr val="FFFFFF"/>
                 </a:solidFill>
               </a14:hiddenFill>
             </a:ext>
             <a:ext uri="{91240B29-F687-4f45-9708-019B960494DF}">
-              <a14:hiddenLine xmlns:a14="http://schemas.microsoft.com/office/drawing/2010/main" xmlns="" w="9525" cap="flat">
+              <a14:hiddenLine xmlns="" xmlns:a14="http://schemas.microsoft.com/office/drawing/2010/main" w="9525" cap="flat">
                 <a:solidFill>
                   <a:srgbClr val="3465A4"/>
                 </a:solidFill>
@@ -6671,7 +6671,7 @@
               </a14:hiddenLine>
             </a:ext>
             <a:ext uri="{AF507438-7753-43e0-B8FC-AC1667EBCBE1}">
-              <a14:hiddenEffects xmlns:a14="http://schemas.microsoft.com/office/drawing/2010/main" xmlns="">
+              <a14:hiddenEffects xmlns="" xmlns:a14="http://schemas.microsoft.com/office/drawing/2010/main">
                 <a:effectLst>
                   <a:outerShdw blurRad="63500" dist="38099" dir="2700000" algn="ctr" rotWithShape="0">
                     <a:schemeClr val="bg2">
@@ -7310,7 +7310,7 @@
         </p:nvSpPr>
         <p:spPr bwMode="auto">
           <a:xfrm>
-            <a:off x="1411288" y="303214"/>
+            <a:off x="1681162" y="274637"/>
             <a:ext cx="8166100" cy="885824"/>
           </a:xfrm>
           <a:prstGeom prst="rect">
@@ -7323,14 +7323,14 @@
           <a:effectLst/>
           <a:extLst>
             <a:ext uri="{909E8E84-426E-40dd-AFC4-6F175D3DCCD1}">
-              <a14:hiddenFill xmlns:a14="http://schemas.microsoft.com/office/drawing/2010/main" xmlns="">
+              <a14:hiddenFill xmlns="" xmlns:a14="http://schemas.microsoft.com/office/drawing/2010/main">
                 <a:solidFill>
                   <a:srgbClr val="FFFFFF"/>
                 </a:solidFill>
               </a14:hiddenFill>
             </a:ext>
             <a:ext uri="{91240B29-F687-4f45-9708-019B960494DF}">
-              <a14:hiddenLine xmlns:a14="http://schemas.microsoft.com/office/drawing/2010/main" xmlns="" w="9525" cap="flat">
+              <a14:hiddenLine xmlns="" xmlns:a14="http://schemas.microsoft.com/office/drawing/2010/main" w="9525" cap="flat">
                 <a:solidFill>
                   <a:srgbClr val="3465A4"/>
                 </a:solidFill>
@@ -7340,7 +7340,7 @@
               </a14:hiddenLine>
             </a:ext>
             <a:ext uri="{AF507438-7753-43e0-B8FC-AC1667EBCBE1}">
-              <a14:hiddenEffects xmlns:a14="http://schemas.microsoft.com/office/drawing/2010/main" xmlns="">
+              <a14:hiddenEffects xmlns="" xmlns:a14="http://schemas.microsoft.com/office/drawing/2010/main">
                 <a:effectLst>
                   <a:outerShdw blurRad="63500" dist="38099" dir="2700000" algn="ctr" rotWithShape="0">
                     <a:srgbClr val="000000">
@@ -7717,8 +7717,12 @@
               <a:defRPr/>
             </a:pPr>
             <a:r>
-              <a:rPr lang="en-US" sz="4400" dirty="0" smtClean="0"/>
-              <a:t>Research Computing</a:t>
+              <a:rPr lang="en-US" sz="4000" smtClean="0"/>
+              <a:t>Academic Research </a:t>
+            </a:r>
+            <a:r>
+              <a:rPr lang="en-US" sz="4000" dirty="0" smtClean="0"/>
+              <a:t>Computing</a:t>
             </a:r>
           </a:p>
         </p:txBody>
@@ -7746,14 +7750,14 @@
           <a:effectLst/>
           <a:extLst>
             <a:ext uri="{909E8E84-426E-40dd-AFC4-6F175D3DCCD1}">
-              <a14:hiddenFill xmlns:a14="http://schemas.microsoft.com/office/drawing/2010/main" xmlns="">
+              <a14:hiddenFill xmlns="" xmlns:a14="http://schemas.microsoft.com/office/drawing/2010/main">
                 <a:solidFill>
                   <a:srgbClr val="FFFFFF"/>
                 </a:solidFill>
               </a14:hiddenFill>
             </a:ext>
             <a:ext uri="{91240B29-F687-4f45-9708-019B960494DF}">
-              <a14:hiddenLine xmlns:a14="http://schemas.microsoft.com/office/drawing/2010/main" xmlns="" w="9525" cap="flat">
+              <a14:hiddenLine xmlns="" xmlns:a14="http://schemas.microsoft.com/office/drawing/2010/main" w="9525" cap="flat">
                 <a:solidFill>
                   <a:srgbClr val="3465A4"/>
                 </a:solidFill>
@@ -7763,7 +7767,7 @@
               </a14:hiddenLine>
             </a:ext>
             <a:ext uri="{AF507438-7753-43e0-B8FC-AC1667EBCBE1}">
-              <a14:hiddenEffects xmlns:a14="http://schemas.microsoft.com/office/drawing/2010/main" xmlns="">
+              <a14:hiddenEffects xmlns="" xmlns:a14="http://schemas.microsoft.com/office/drawing/2010/main">
                 <a:effectLst>
                   <a:outerShdw blurRad="63500" dist="38099" dir="2700000" algn="ctr" rotWithShape="0">
                     <a:srgbClr val="000000">
@@ -8130,7 +8134,7 @@
               </a:spcAft>
             </a:pPr>
             <a:r>
-              <a:rPr lang="en-US" altLang="en-US" sz="3200" u="sng" dirty="0" smtClean="0">
+              <a:rPr lang="en-US" altLang="en-US" sz="3200" b="1" dirty="0" smtClean="0">
                 <a:solidFill>
                   <a:srgbClr val="000000"/>
                 </a:solidFill>
@@ -8213,7 +8217,7 @@
               </a:spcAft>
             </a:pPr>
             <a:r>
-              <a:rPr lang="en-US" altLang="en-US" sz="3200" u="sng" dirty="0" smtClean="0">
+              <a:rPr lang="en-US" altLang="en-US" sz="3200" b="1" dirty="0" smtClean="0">
                 <a:solidFill>
                   <a:srgbClr val="000000"/>
                 </a:solidFill>
@@ -8226,23 +8230,7 @@
                   <a:srgbClr val="000000"/>
                 </a:solidFill>
               </a:rPr>
-              <a:t>: “You’re </a:t>
-            </a:r>
-            <a:r>
-              <a:rPr lang="en-US" altLang="en-US" sz="3200" dirty="0" smtClean="0">
-                <a:solidFill>
-                  <a:srgbClr val="000000"/>
-                </a:solidFill>
-              </a:rPr>
-              <a:t>here (in academia) to </a:t>
-            </a:r>
-            <a:r>
-              <a:rPr lang="en-US" altLang="en-US" sz="3200" dirty="0" smtClean="0">
-                <a:solidFill>
-                  <a:srgbClr val="000000"/>
-                </a:solidFill>
-              </a:rPr>
-              <a:t>learn.”</a:t>
+              <a:t>: “You’re here (in academia) to learn.”</a:t>
             </a:r>
             <a:endParaRPr lang="en-US" altLang="en-US" sz="3200" dirty="0">
               <a:solidFill>
@@ -8280,7 +8268,23 @@
                   <a:srgbClr val="000000"/>
                 </a:solidFill>
               </a:rPr>
-              <a:t>spend much of their time developing, maintaining, </a:t>
+              <a:t>spend much of their </a:t>
+            </a:r>
+            <a:r>
+              <a:rPr lang="en-US" altLang="en-US" sz="3200" dirty="0" smtClean="0">
+                <a:solidFill>
+                  <a:srgbClr val="000000"/>
+                </a:solidFill>
+              </a:rPr>
+              <a:t>research time </a:t>
+            </a:r>
+            <a:r>
+              <a:rPr lang="en-US" altLang="en-US" sz="3200" dirty="0">
+                <a:solidFill>
+                  <a:srgbClr val="000000"/>
+                </a:solidFill>
+              </a:rPr>
+              <a:t>developing, maintaining, </a:t>
             </a:r>
             <a:r>
               <a:rPr lang="en-US" altLang="en-US" sz="3200" dirty="0" smtClean="0">
@@ -8291,21 +8295,18 @@
               <a:t>&amp; running </a:t>
             </a:r>
             <a:r>
-              <a:rPr lang="en-US" altLang="en-US" sz="3200" dirty="0">
+              <a:rPr lang="en-US" altLang="en-US" sz="3200" dirty="0" smtClean="0">
                 <a:solidFill>
                   <a:srgbClr val="000000"/>
                 </a:solidFill>
               </a:rPr>
-              <a:t>software </a:t>
-            </a:r>
-            <a:r>
-              <a:rPr lang="en-US" altLang="en-US" sz="3200" dirty="0" smtClean="0">
-                <a:solidFill>
-                  <a:srgbClr val="000000"/>
-                </a:solidFill>
-              </a:rPr>
-              <a:t>for data collection, analysis, publication prep</a:t>
-            </a:r>
+              <a:t>software programs, often repeatedly</a:t>
+            </a:r>
+            <a:endParaRPr lang="en-US" altLang="en-US" sz="3200" dirty="0" smtClean="0">
+              <a:solidFill>
+                <a:srgbClr val="000000"/>
+              </a:solidFill>
+            </a:endParaRPr>
           </a:p>
           <a:p>
             <a:pPr lvl="1" eaLnBrk="1">
@@ -8324,36 +8325,12 @@
               <a:t>Few </a:t>
             </a:r>
             <a:r>
-              <a:rPr lang="en-US" altLang="en-US" sz="3200" dirty="0" err="1" smtClean="0">
+              <a:rPr lang="en-US" altLang="en-US" sz="3200" dirty="0" smtClean="0">
                 <a:solidFill>
                   <a:srgbClr val="000000"/>
                 </a:solidFill>
               </a:rPr>
-              <a:t>scis</a:t>
-            </a:r>
-            <a:r>
-              <a:rPr lang="en-US" altLang="en-US" sz="3200" dirty="0" smtClean="0">
-                <a:solidFill>
-                  <a:srgbClr val="000000"/>
-                </a:solidFill>
-              </a:rPr>
-              <a:t> have </a:t>
-            </a:r>
-            <a:r>
-              <a:rPr lang="en-US" altLang="en-US" sz="3200" dirty="0">
-                <a:solidFill>
-                  <a:srgbClr val="000000"/>
-                </a:solidFill>
-              </a:rPr>
-              <a:t>ever </a:t>
-            </a:r>
-            <a:r>
-              <a:rPr lang="en-US" altLang="en-US" sz="3200" dirty="0" smtClean="0">
-                <a:solidFill>
-                  <a:srgbClr val="000000"/>
-                </a:solidFill>
-              </a:rPr>
-              <a:t>learned programming formally </a:t>
+              <a:t>scientists ever have formal software training </a:t>
             </a:r>
             <a:r>
               <a:rPr lang="en-US" altLang="en-US" sz="3200" dirty="0" smtClean="0">
@@ -8362,7 +8339,16 @@
                 </a:solidFill>
                 <a:sym typeface="Wingdings"/>
               </a:rPr>
-              <a:t>  development often takes longer </a:t>
+              <a:t>  </a:t>
+            </a:r>
+            <a:r>
+              <a:rPr lang="en-US" altLang="en-US" sz="3200" dirty="0" smtClean="0">
+                <a:solidFill>
+                  <a:srgbClr val="000000"/>
+                </a:solidFill>
+                <a:sym typeface="Wingdings"/>
+              </a:rPr>
+              <a:t>development often takes longer </a:t>
             </a:r>
             <a:endParaRPr lang="en-US" altLang="en-US" sz="3200" dirty="0" smtClean="0">
               <a:solidFill>
@@ -8384,39 +8370,7 @@
                   <a:srgbClr val="000000"/>
                 </a:solidFill>
               </a:rPr>
-              <a:t>Are we Software Engineers? </a:t>
-            </a:r>
-            <a:r>
-              <a:rPr lang="en-US" altLang="en-US" sz="3200" dirty="0" smtClean="0">
-                <a:solidFill>
-                  <a:srgbClr val="000000"/>
-                </a:solidFill>
-              </a:rPr>
-              <a:t>Developers</a:t>
-            </a:r>
-            <a:r>
-              <a:rPr lang="en-US" altLang="en-US" sz="3200" dirty="0" smtClean="0">
-                <a:solidFill>
-                  <a:srgbClr val="000000"/>
-                </a:solidFill>
-              </a:rPr>
-              <a:t>? Programmers? </a:t>
-            </a:r>
-            <a:r>
-              <a:rPr lang="en-US" altLang="en-US" sz="3200" dirty="0" smtClean="0">
-                <a:solidFill>
-                  <a:srgbClr val="000000"/>
-                </a:solidFill>
-              </a:rPr>
-              <a:t>Coders? Hackers</a:t>
-            </a:r>
-            <a:r>
-              <a:rPr lang="en-US" altLang="en-US" sz="3200" dirty="0" smtClean="0">
-                <a:solidFill>
-                  <a:srgbClr val="000000"/>
-                </a:solidFill>
-              </a:rPr>
-              <a:t>?</a:t>
+              <a:t>Are we Software Engineers? Developers? Programmers? Coders? Hackers?</a:t>
             </a:r>
             <a:endParaRPr lang="en-US" altLang="en-US" sz="3200" dirty="0">
               <a:solidFill>
@@ -8649,16 +8603,6 @@
               <a:buChar char="•"/>
             </a:pPr>
             <a:r>
-              <a:rPr lang="en-US" altLang="en-US" dirty="0"/>
-              <a:t>Don’t repeat yourself</a:t>
-            </a:r>
-          </a:p>
-          <a:p>
-            <a:pPr marL="457200" indent="-457200">
-              <a:buFont typeface="Arial" charset="0"/>
-              <a:buChar char="•"/>
-            </a:pPr>
-            <a:r>
               <a:rPr lang="en-US" altLang="en-US" dirty="0" smtClean="0"/>
               <a:t>Make </a:t>
             </a:r>
@@ -8792,16 +8736,6 @@
               <a:buChar char="•"/>
             </a:pPr>
             <a:r>
-              <a:rPr lang="en-US" altLang="en-US" dirty="0"/>
-              <a:t>Don’t repeat yourself</a:t>
-            </a:r>
-          </a:p>
-          <a:p>
-            <a:pPr marL="457200" indent="-457200">
-              <a:buFont typeface="Arial" charset="0"/>
-              <a:buChar char="•"/>
-            </a:pPr>
-            <a:r>
               <a:rPr lang="en-US" altLang="en-US" dirty="0" smtClean="0"/>
               <a:t>Document </a:t>
             </a:r>
@@ -8859,7 +8793,7 @@
         </p:nvSpPr>
         <p:spPr>
           <a:xfrm>
-            <a:off x="5116512" y="5532437"/>
+            <a:off x="5610740" y="5357811"/>
             <a:ext cx="4191000" cy="1470025"/>
           </a:xfrm>
           <a:prstGeom prst="rect">
@@ -9002,14 +8936,14 @@
           <a:effectLst/>
           <a:extLst>
             <a:ext uri="{909E8E84-426E-40dd-AFC4-6F175D3DCCD1}">
-              <a14:hiddenFill xmlns:a14="http://schemas.microsoft.com/office/drawing/2010/main" xmlns="">
+              <a14:hiddenFill xmlns="" xmlns:a14="http://schemas.microsoft.com/office/drawing/2010/main">
                 <a:solidFill>
                   <a:srgbClr val="FFFFFF"/>
                 </a:solidFill>
               </a14:hiddenFill>
             </a:ext>
             <a:ext uri="{91240B29-F687-4f45-9708-019B960494DF}">
-              <a14:hiddenLine xmlns:a14="http://schemas.microsoft.com/office/drawing/2010/main" xmlns="" w="9525" cap="flat">
+              <a14:hiddenLine xmlns="" xmlns:a14="http://schemas.microsoft.com/office/drawing/2010/main" w="9525" cap="flat">
                 <a:solidFill>
                   <a:srgbClr val="3465A4"/>
                 </a:solidFill>
@@ -9019,7 +8953,7 @@
               </a14:hiddenLine>
             </a:ext>
             <a:ext uri="{AF507438-7753-43e0-B8FC-AC1667EBCBE1}">
-              <a14:hiddenEffects xmlns:a14="http://schemas.microsoft.com/office/drawing/2010/main" xmlns="">
+              <a14:hiddenEffects xmlns="" xmlns:a14="http://schemas.microsoft.com/office/drawing/2010/main">
                 <a:effectLst>
                   <a:outerShdw blurRad="63500" dist="38099" dir="2700000" algn="ctr" rotWithShape="0">
                     <a:srgbClr val="000000">
@@ -9397,13 +9331,8 @@
             </a:pPr>
             <a:r>
               <a:rPr lang="en-US" sz="4000" dirty="0" smtClean="0"/>
-              <a:t>SWC Python </a:t>
-            </a:r>
-            <a:r>
-              <a:rPr lang="en-US" sz="4000" dirty="0" smtClean="0"/>
-              <a:t>Components</a:t>
-            </a:r>
-            <a:endParaRPr lang="en-US" sz="4000" dirty="0" smtClean="0"/>
+              <a:t>SWC Python Components</a:t>
+            </a:r>
           </a:p>
         </p:txBody>
       </p:sp>
@@ -9430,14 +9359,14 @@
           <a:effectLst/>
           <a:extLst>
             <a:ext uri="{909E8E84-426E-40dd-AFC4-6F175D3DCCD1}">
-              <a14:hiddenFill xmlns:a14="http://schemas.microsoft.com/office/drawing/2010/main" xmlns="">
+              <a14:hiddenFill xmlns="" xmlns:a14="http://schemas.microsoft.com/office/drawing/2010/main">
                 <a:solidFill>
                   <a:srgbClr val="FFFFFF"/>
                 </a:solidFill>
               </a14:hiddenFill>
             </a:ext>
             <a:ext uri="{91240B29-F687-4f45-9708-019B960494DF}">
-              <a14:hiddenLine xmlns:a14="http://schemas.microsoft.com/office/drawing/2010/main" xmlns="" w="9525" cap="flat">
+              <a14:hiddenLine xmlns="" xmlns:a14="http://schemas.microsoft.com/office/drawing/2010/main" w="9525" cap="flat">
                 <a:solidFill>
                   <a:srgbClr val="3465A4"/>
                 </a:solidFill>
@@ -9447,7 +9376,7 @@
               </a14:hiddenLine>
             </a:ext>
             <a:ext uri="{AF507438-7753-43e0-B8FC-AC1667EBCBE1}">
-              <a14:hiddenEffects xmlns:a14="http://schemas.microsoft.com/office/drawing/2010/main" xmlns="">
+              <a14:hiddenEffects xmlns="" xmlns:a14="http://schemas.microsoft.com/office/drawing/2010/main">
                 <a:effectLst>
                   <a:outerShdw blurRad="63500" dist="38099" dir="2700000" algn="ctr" rotWithShape="0">
                     <a:srgbClr val="000000">
@@ -9900,14 +9829,10 @@
               <a:t>up, save it, </a:t>
             </a:r>
             <a:r>
-              <a:rPr lang="en-US" sz="3200" dirty="0"/>
-              <a:t>and share </a:t>
-            </a:r>
-            <a:r>
-              <a:rPr lang="en-US" sz="3200" dirty="0" smtClean="0"/>
-              <a:t>it</a:t>
-            </a:r>
-            <a:endParaRPr lang="en-US" sz="3200" dirty="0" smtClean="0">
+              <a:rPr lang="en-US" sz="3200" smtClean="0"/>
+              <a:t>share it, reuse it</a:t>
+            </a:r>
+            <a:endParaRPr lang="en-US" sz="3200" smtClean="0">
               <a:cs typeface="Arial Unicode MS" charset="0"/>
             </a:endParaRPr>
           </a:p>
@@ -9940,6 +9865,7 @@
               <a:rPr lang="en-US" sz="3200" dirty="0" smtClean="0"/>
               <a:t>Organization</a:t>
             </a:r>
+            <a:endParaRPr lang="en-US" sz="3200" dirty="0" smtClean="0"/>
           </a:p>
           <a:p>
             <a:pPr lvl="1">
@@ -9952,8 +9878,9 @@
             </a:pPr>
             <a:r>
               <a:rPr lang="en-US" sz="3200" dirty="0" smtClean="0"/>
-              <a:t>Commenting</a:t>
-            </a:r>
+              <a:t>Commenting and Documentation</a:t>
+            </a:r>
+            <a:endParaRPr lang="en-US" sz="3200" dirty="0" smtClean="0"/>
           </a:p>
           <a:p>
             <a:pPr lvl="1">
@@ -10047,14 +9974,14 @@
           <a:effectLst/>
           <a:extLst>
             <a:ext uri="{909E8E84-426E-40dd-AFC4-6F175D3DCCD1}">
-              <a14:hiddenFill xmlns:a14="http://schemas.microsoft.com/office/drawing/2010/main" xmlns="">
+              <a14:hiddenFill xmlns="" xmlns:a14="http://schemas.microsoft.com/office/drawing/2010/main">
                 <a:solidFill>
                   <a:srgbClr val="FFFFFF"/>
                 </a:solidFill>
               </a14:hiddenFill>
             </a:ext>
             <a:ext uri="{91240B29-F687-4f45-9708-019B960494DF}">
-              <a14:hiddenLine xmlns:a14="http://schemas.microsoft.com/office/drawing/2010/main" xmlns="" w="9525" cap="flat">
+              <a14:hiddenLine xmlns="" xmlns:a14="http://schemas.microsoft.com/office/drawing/2010/main" w="9525" cap="flat">
                 <a:solidFill>
                   <a:srgbClr val="3465A4"/>
                 </a:solidFill>
@@ -10064,7 +9991,7 @@
               </a14:hiddenLine>
             </a:ext>
             <a:ext uri="{AF507438-7753-43e0-B8FC-AC1667EBCBE1}">
-              <a14:hiddenEffects xmlns:a14="http://schemas.microsoft.com/office/drawing/2010/main" xmlns="">
+              <a14:hiddenEffects xmlns="" xmlns:a14="http://schemas.microsoft.com/office/drawing/2010/main">
                 <a:effectLst>
                   <a:outerShdw blurRad="63500" dist="38099" dir="2700000" algn="ctr" rotWithShape="0">
                     <a:srgbClr val="000000">
@@ -10442,11 +10369,7 @@
             </a:pPr>
             <a:r>
               <a:rPr lang="en-US" sz="4000" dirty="0" smtClean="0"/>
-              <a:t>I have data. Where </a:t>
-            </a:r>
-            <a:r>
-              <a:rPr lang="en-US" sz="4000" dirty="0" smtClean="0"/>
-              <a:t>do I start?</a:t>
+              <a:t>I have data. Where do I start?</a:t>
             </a:r>
           </a:p>
         </p:txBody>
@@ -10474,14 +10397,14 @@
           <a:effectLst/>
           <a:extLst>
             <a:ext uri="{909E8E84-426E-40dd-AFC4-6F175D3DCCD1}">
-              <a14:hiddenFill xmlns:a14="http://schemas.microsoft.com/office/drawing/2010/main" xmlns="">
+              <a14:hiddenFill xmlns="" xmlns:a14="http://schemas.microsoft.com/office/drawing/2010/main">
                 <a:solidFill>
                   <a:srgbClr val="FFFFFF"/>
                 </a:solidFill>
               </a14:hiddenFill>
             </a:ext>
             <a:ext uri="{91240B29-F687-4f45-9708-019B960494DF}">
-              <a14:hiddenLine xmlns:a14="http://schemas.microsoft.com/office/drawing/2010/main" xmlns="" w="9525" cap="flat">
+              <a14:hiddenLine xmlns="" xmlns:a14="http://schemas.microsoft.com/office/drawing/2010/main" w="9525" cap="flat">
                 <a:solidFill>
                   <a:srgbClr val="3465A4"/>
                 </a:solidFill>
@@ -10491,7 +10414,7 @@
               </a14:hiddenLine>
             </a:ext>
             <a:ext uri="{AF507438-7753-43e0-B8FC-AC1667EBCBE1}">
-              <a14:hiddenEffects xmlns:a14="http://schemas.microsoft.com/office/drawing/2010/main" xmlns="">
+              <a14:hiddenEffects xmlns="" xmlns:a14="http://schemas.microsoft.com/office/drawing/2010/main">
                 <a:effectLst>
                   <a:outerShdw blurRad="63500" dist="38099" dir="2700000" algn="ctr" rotWithShape="0">
                     <a:srgbClr val="000000">
@@ -10873,8 +10796,11 @@
               <a:rPr lang="en-US" sz="4000" dirty="0" smtClean="0">
                 <a:cs typeface="Arial Unicode MS" charset="0"/>
               </a:rPr>
-              <a:t>Ponder the nature of your data</a:t>
-            </a:r>
+              <a:t>What kind of data? Many sources?</a:t>
+            </a:r>
+            <a:endParaRPr lang="en-US" sz="4000" dirty="0" smtClean="0">
+              <a:cs typeface="Arial Unicode MS" charset="0"/>
+            </a:endParaRPr>
           </a:p>
           <a:p>
             <a:pPr>
@@ -10889,8 +10815,23 @@
               <a:rPr lang="en-US" sz="4000" dirty="0" smtClean="0">
                 <a:cs typeface="Arial Unicode MS" charset="0"/>
               </a:rPr>
-              <a:t>Consider the purpose of your work</a:t>
-            </a:r>
+              <a:t>What is </a:t>
+            </a:r>
+            <a:r>
+              <a:rPr lang="en-US" sz="4000" dirty="0" smtClean="0">
+                <a:cs typeface="Arial Unicode MS" charset="0"/>
+              </a:rPr>
+              <a:t>the purpose of your </a:t>
+            </a:r>
+            <a:r>
+              <a:rPr lang="en-US" sz="4000" dirty="0" smtClean="0">
+                <a:cs typeface="Arial Unicode MS" charset="0"/>
+              </a:rPr>
+              <a:t>work?</a:t>
+            </a:r>
+            <a:endParaRPr lang="en-US" sz="4000" dirty="0" smtClean="0">
+              <a:cs typeface="Arial Unicode MS" charset="0"/>
+            </a:endParaRPr>
           </a:p>
           <a:p>
             <a:pPr lvl="1">
@@ -10965,33 +10906,47 @@
               <a:rPr lang="en-US" sz="4000" dirty="0" smtClean="0">
                 <a:cs typeface="Arial Unicode MS" charset="0"/>
               </a:rPr>
-              <a:t>Choose a </a:t>
+              <a:t>Which </a:t>
             </a:r>
             <a:r>
               <a:rPr lang="en-US" sz="4000" dirty="0" smtClean="0">
                 <a:cs typeface="Arial Unicode MS" charset="0"/>
               </a:rPr>
-              <a:t>programming language</a:t>
+              <a:t>programming </a:t>
+            </a:r>
+            <a:r>
+              <a:rPr lang="en-US" sz="4000" dirty="0" smtClean="0">
+                <a:cs typeface="Arial Unicode MS" charset="0"/>
+              </a:rPr>
+              <a:t>language?</a:t>
+            </a:r>
+            <a:endParaRPr lang="en-US" sz="4000" dirty="0">
+              <a:cs typeface="Arial Unicode MS" charset="0"/>
+            </a:endParaRPr>
+          </a:p>
+          <a:p>
+            <a:pPr marL="0" indent="0">
+              <a:spcAft>
+                <a:spcPts val="1425"/>
+              </a:spcAft>
+              <a:defRPr/>
+            </a:pPr>
+            <a:r>
+              <a:rPr lang="en-US" sz="4000" dirty="0" smtClean="0">
+                <a:cs typeface="Arial Unicode MS" charset="0"/>
+                <a:sym typeface="Wingdings"/>
+              </a:rPr>
+              <a:t> </a:t>
+            </a:r>
+            <a:r>
+              <a:rPr lang="en-US" sz="4000" dirty="0" smtClean="0">
+                <a:cs typeface="Arial Unicode MS" charset="0"/>
+              </a:rPr>
+              <a:t>Develop a workflow</a:t>
             </a:r>
             <a:endParaRPr lang="en-US" sz="4000" dirty="0" smtClean="0">
               <a:cs typeface="Arial Unicode MS" charset="0"/>
             </a:endParaRPr>
-          </a:p>
-          <a:p>
-            <a:pPr>
-              <a:spcAft>
-                <a:spcPts val="1425"/>
-              </a:spcAft>
-              <a:buFont typeface="Arial" charset="0"/>
-              <a:buChar char="•"/>
-              <a:defRPr/>
-            </a:pPr>
-            <a:r>
-              <a:rPr lang="en-US" sz="4000" dirty="0" smtClean="0">
-                <a:cs typeface="Arial Unicode MS" charset="0"/>
-              </a:rPr>
-              <a:t>Build a workflow</a:t>
-            </a:r>
           </a:p>
         </p:txBody>
       </p:sp>
@@ -11076,14 +11031,14 @@
           <a:effectLst/>
           <a:extLst>
             <a:ext uri="{909E8E84-426E-40dd-AFC4-6F175D3DCCD1}">
-              <a14:hiddenFill xmlns:a14="http://schemas.microsoft.com/office/drawing/2010/main" xmlns="">
+              <a14:hiddenFill xmlns="" xmlns:a14="http://schemas.microsoft.com/office/drawing/2010/main">
                 <a:solidFill>
                   <a:srgbClr val="FFFFFF"/>
                 </a:solidFill>
               </a14:hiddenFill>
             </a:ext>
             <a:ext uri="{91240B29-F687-4f45-9708-019B960494DF}">
-              <a14:hiddenLine xmlns:a14="http://schemas.microsoft.com/office/drawing/2010/main" xmlns="" w="9525" cap="flat">
+              <a14:hiddenLine xmlns="" xmlns:a14="http://schemas.microsoft.com/office/drawing/2010/main" w="9525" cap="flat">
                 <a:solidFill>
                   <a:srgbClr val="3465A4"/>
                 </a:solidFill>
@@ -11093,7 +11048,7 @@
               </a14:hiddenLine>
             </a:ext>
             <a:ext uri="{AF507438-7753-43e0-B8FC-AC1667EBCBE1}">
-              <a14:hiddenEffects xmlns:a14="http://schemas.microsoft.com/office/drawing/2010/main" xmlns="">
+              <a14:hiddenEffects xmlns="" xmlns:a14="http://schemas.microsoft.com/office/drawing/2010/main">
                 <a:effectLst>
                   <a:outerShdw blurRad="63500" dist="38099" dir="2700000" algn="ctr" rotWithShape="0">
                     <a:srgbClr val="000000">
@@ -11528,7 +11483,7 @@
         <p:spPr>
           <a:xfrm>
             <a:off x="5906516" y="1429829"/>
-            <a:ext cx="3681984" cy="5017008"/>
+            <a:ext cx="3248596" cy="4426481"/>
           </a:xfrm>
           <a:prstGeom prst="rect">
             <a:avLst/>
@@ -11543,7 +11498,7 @@
         </p:nvSpPr>
         <p:spPr bwMode="auto">
           <a:xfrm>
-            <a:off x="4887912" y="3779678"/>
+            <a:off x="4811711" y="3494054"/>
             <a:ext cx="1018604" cy="297180"/>
           </a:xfrm>
           <a:prstGeom prst="rightArrow">
@@ -11564,7 +11519,7 @@
           <a:effectLst/>
           <a:extLst>
             <a:ext uri="{AF507438-7753-43e0-B8FC-AC1667EBCBE1}">
-              <a14:hiddenEffects xmlns:a14="http://schemas.microsoft.com/office/drawing/2010/main" xmlns="">
+              <a14:hiddenEffects xmlns="" xmlns:a14="http://schemas.microsoft.com/office/drawing/2010/main">
                 <a:effectLst>
                   <a:outerShdw blurRad="63500" dist="38099" dir="2700000" algn="ctr" rotWithShape="0">
                     <a:schemeClr val="bg2">
@@ -11625,7 +11580,7 @@
         </p:nvSpPr>
         <p:spPr>
           <a:xfrm>
-            <a:off x="5399533" y="6317549"/>
+            <a:off x="5418697" y="5856310"/>
             <a:ext cx="4224233" cy="607539"/>
           </a:xfrm>
           <a:prstGeom prst="rect">
@@ -11752,14 +11707,14 @@
           <a:effectLst/>
           <a:extLst>
             <a:ext uri="{909E8E84-426E-40dd-AFC4-6F175D3DCCD1}">
-              <a14:hiddenFill xmlns:a14="http://schemas.microsoft.com/office/drawing/2010/main" xmlns="">
+              <a14:hiddenFill xmlns="" xmlns:a14="http://schemas.microsoft.com/office/drawing/2010/main">
                 <a:solidFill>
                   <a:srgbClr val="FFFFFF"/>
                 </a:solidFill>
               </a14:hiddenFill>
             </a:ext>
             <a:ext uri="{91240B29-F687-4f45-9708-019B960494DF}">
-              <a14:hiddenLine xmlns:a14="http://schemas.microsoft.com/office/drawing/2010/main" xmlns="" w="9525" cap="flat">
+              <a14:hiddenLine xmlns="" xmlns:a14="http://schemas.microsoft.com/office/drawing/2010/main" w="9525" cap="flat">
                 <a:solidFill>
                   <a:srgbClr val="3465A4"/>
                 </a:solidFill>
@@ -11769,7 +11724,7 @@
               </a14:hiddenLine>
             </a:ext>
             <a:ext uri="{AF507438-7753-43e0-B8FC-AC1667EBCBE1}">
-              <a14:hiddenEffects xmlns:a14="http://schemas.microsoft.com/office/drawing/2010/main" xmlns="">
+              <a14:hiddenEffects xmlns="" xmlns:a14="http://schemas.microsoft.com/office/drawing/2010/main">
                 <a:effectLst>
                   <a:outerShdw blurRad="63500" dist="38099" dir="2700000" algn="ctr" rotWithShape="0">
                     <a:srgbClr val="000000">
@@ -12149,7 +12104,6 @@
               <a:rPr lang="en-US" sz="4000" dirty="0" smtClean="0"/>
               <a:t>Python — Our Progression </a:t>
             </a:r>
-            <a:endParaRPr lang="en-US" sz="4000" dirty="0" smtClean="0"/>
           </a:p>
         </p:txBody>
       </p:sp>
@@ -12176,14 +12130,14 @@
           <a:effectLst/>
           <a:extLst>
             <a:ext uri="{909E8E84-426E-40dd-AFC4-6F175D3DCCD1}">
-              <a14:hiddenFill xmlns:a14="http://schemas.microsoft.com/office/drawing/2010/main" xmlns="">
+              <a14:hiddenFill xmlns="" xmlns:a14="http://schemas.microsoft.com/office/drawing/2010/main">
                 <a:solidFill>
                   <a:srgbClr val="FFFFFF"/>
                 </a:solidFill>
               </a14:hiddenFill>
             </a:ext>
             <a:ext uri="{91240B29-F687-4f45-9708-019B960494DF}">
-              <a14:hiddenLine xmlns:a14="http://schemas.microsoft.com/office/drawing/2010/main" xmlns="" w="9525" cap="flat">
+              <a14:hiddenLine xmlns="" xmlns:a14="http://schemas.microsoft.com/office/drawing/2010/main" w="9525" cap="flat">
                 <a:solidFill>
                   <a:srgbClr val="3465A4"/>
                 </a:solidFill>
@@ -12193,7 +12147,7 @@
               </a14:hiddenLine>
             </a:ext>
             <a:ext uri="{AF507438-7753-43e0-B8FC-AC1667EBCBE1}">
-              <a14:hiddenEffects xmlns:a14="http://schemas.microsoft.com/office/drawing/2010/main" xmlns="">
+              <a14:hiddenEffects xmlns="" xmlns:a14="http://schemas.microsoft.com/office/drawing/2010/main">
                 <a:effectLst>
                   <a:outerShdw blurRad="63500" dist="38099" dir="2700000" algn="ctr" rotWithShape="0">
                     <a:srgbClr val="000000">
@@ -12573,8 +12527,27 @@
             </a:pPr>
             <a:r>
               <a:rPr lang="en-US" sz="2800" dirty="0" smtClean="0"/>
-              <a:t>Variable names</a:t>
-            </a:r>
+              <a:t>Variable </a:t>
+            </a:r>
+            <a:r>
+              <a:rPr lang="en-US" sz="2800" dirty="0" smtClean="0"/>
+              <a:t>types</a:t>
+            </a:r>
+          </a:p>
+          <a:p>
+            <a:pPr marL="742950" lvl="1" indent="-342900">
+              <a:spcAft>
+                <a:spcPts val="1425"/>
+              </a:spcAft>
+              <a:buFont typeface="Arial" charset="0"/>
+              <a:buChar char="•"/>
+              <a:defRPr/>
+            </a:pPr>
+            <a:r>
+              <a:rPr lang="en-US" sz="2800" dirty="0" smtClean="0"/>
+              <a:t>Focus on Booleans</a:t>
+            </a:r>
+            <a:endParaRPr lang="en-US" sz="2800" dirty="0"/>
           </a:p>
           <a:p>
             <a:pPr marL="457200" indent="-457200">
@@ -12587,7 +12560,26 @@
             </a:pPr>
             <a:r>
               <a:rPr lang="en-US" sz="2800" dirty="0" smtClean="0"/>
-              <a:t>Variable types</a:t>
+              <a:t>Conditional </a:t>
+            </a:r>
+            <a:r>
+              <a:rPr lang="en-US" sz="2800" dirty="0" smtClean="0"/>
+              <a:t>Statements</a:t>
+            </a:r>
+            <a:endParaRPr lang="en-US" sz="2800" dirty="0" smtClean="0"/>
+          </a:p>
+          <a:p>
+            <a:pPr marL="457200" indent="-457200">
+              <a:spcAft>
+                <a:spcPts val="1425"/>
+              </a:spcAft>
+              <a:buFont typeface="+mj-lt"/>
+              <a:buAutoNum type="arabicPeriod"/>
+              <a:defRPr/>
+            </a:pPr>
+            <a:r>
+              <a:rPr lang="en-US" sz="2800" dirty="0" smtClean="0"/>
+              <a:t>Lists</a:t>
             </a:r>
           </a:p>
           <a:p>
@@ -12601,37 +12593,9 @@
             </a:pPr>
             <a:r>
               <a:rPr lang="en-US" sz="2800" dirty="0" smtClean="0"/>
-              <a:t>Boolean type</a:t>
-            </a:r>
-            <a:endParaRPr lang="en-US" sz="2800" dirty="0"/>
-          </a:p>
-          <a:p>
-            <a:pPr marL="457200" indent="-457200">
-              <a:spcAft>
-                <a:spcPts val="1425"/>
-              </a:spcAft>
-              <a:buFont typeface="+mj-lt"/>
-              <a:buAutoNum type="arabicPeriod"/>
-              <a:defRPr/>
-            </a:pPr>
-            <a:r>
-              <a:rPr lang="en-US" sz="2800" dirty="0" smtClean="0"/>
-              <a:t>Conditional statements</a:t>
-            </a:r>
-          </a:p>
-          <a:p>
-            <a:pPr marL="457200" indent="-457200">
-              <a:spcAft>
-                <a:spcPts val="1425"/>
-              </a:spcAft>
-              <a:buFont typeface="+mj-lt"/>
-              <a:buAutoNum type="arabicPeriod"/>
-              <a:defRPr/>
-            </a:pPr>
-            <a:r>
-              <a:rPr lang="en-US" sz="2800" dirty="0" smtClean="0"/>
-              <a:t>Lists</a:t>
-            </a:r>
+              <a:t>Counting / Indexing</a:t>
+            </a:r>
+            <a:endParaRPr lang="en-US" sz="2800" dirty="0" smtClean="0"/>
           </a:p>
           <a:p>
             <a:pPr marL="742950" lvl="1" indent="-342900">
@@ -12644,8 +12608,32 @@
             </a:pPr>
             <a:r>
               <a:rPr lang="en-US" sz="2800" dirty="0" smtClean="0"/>
-              <a:t>Indexing</a:t>
-            </a:r>
+              <a:t>Pointing </a:t>
+            </a:r>
+            <a:r>
+              <a:rPr lang="en-US" sz="2800" dirty="0" smtClean="0"/>
+              <a:t>&amp; </a:t>
+            </a:r>
+            <a:r>
+              <a:rPr lang="en-US" sz="2800" dirty="0" smtClean="0"/>
+              <a:t>Copying</a:t>
+            </a:r>
+            <a:endParaRPr lang="en-US" sz="2800" dirty="0"/>
+          </a:p>
+          <a:p>
+            <a:pPr marL="457200" indent="-457200">
+              <a:spcAft>
+                <a:spcPts val="1425"/>
+              </a:spcAft>
+              <a:buFont typeface="+mj-lt"/>
+              <a:buAutoNum type="arabicPeriod" startAt="5"/>
+              <a:defRPr/>
+            </a:pPr>
+            <a:r>
+              <a:rPr lang="en-US" sz="2800" dirty="0" smtClean="0"/>
+              <a:t>Arrays</a:t>
+            </a:r>
+            <a:endParaRPr lang="en-US" sz="2800" dirty="0" smtClean="0"/>
           </a:p>
           <a:p>
             <a:pPr marL="742950" lvl="1" indent="-342900">
@@ -12657,10 +12645,10 @@
               <a:defRPr/>
             </a:pPr>
             <a:r>
-              <a:rPr lang="en-US" sz="2800" dirty="0" smtClean="0"/>
-              <a:t>Pointing </a:t>
-            </a:r>
-            <a:endParaRPr lang="en-US" sz="2800" dirty="0"/>
+              <a:rPr lang="en-US" sz="2800" dirty="0" err="1" smtClean="0"/>
+              <a:t>Numpy</a:t>
+            </a:r>
+            <a:endParaRPr lang="en-US" sz="2800" dirty="0" smtClean="0"/>
           </a:p>
           <a:p>
             <a:pPr marL="742950" lvl="1" indent="-342900">
@@ -12673,80 +12661,15 @@
             </a:pPr>
             <a:r>
               <a:rPr lang="en-US" sz="2800" dirty="0" smtClean="0"/>
-              <a:t>Copying</a:t>
-            </a:r>
-            <a:endParaRPr lang="en-US" sz="2800" dirty="0"/>
-          </a:p>
-          <a:p>
-            <a:pPr marL="742950" lvl="1" indent="-342900">
-              <a:spcAft>
-                <a:spcPts val="1425"/>
-              </a:spcAft>
-              <a:buFont typeface="Arial" charset="0"/>
-              <a:buChar char="•"/>
-              <a:defRPr/>
-            </a:pPr>
+              <a:t>Indexing </a:t>
+            </a:r>
+            <a:r>
+              <a:rPr lang="en-US" sz="2800" dirty="0" smtClean="0"/>
+              <a:t>&amp; </a:t>
+            </a:r>
             <a:r>
               <a:rPr lang="en-US" sz="2800" dirty="0" smtClean="0"/>
               <a:t>Slices</a:t>
-            </a:r>
-            <a:endParaRPr lang="en-US" sz="2800" dirty="0"/>
-          </a:p>
-          <a:p>
-            <a:pPr marL="457200" indent="-457200">
-              <a:spcAft>
-                <a:spcPts val="1425"/>
-              </a:spcAft>
-              <a:buFont typeface="+mj-lt"/>
-              <a:buAutoNum type="arabicPeriod" startAt="5"/>
-              <a:defRPr/>
-            </a:pPr>
-            <a:r>
-              <a:rPr lang="en-US" sz="2800" dirty="0" smtClean="0"/>
-              <a:t>Arrays</a:t>
-            </a:r>
-          </a:p>
-          <a:p>
-            <a:pPr marL="742950" lvl="1" indent="-342900">
-              <a:spcAft>
-                <a:spcPts val="1425"/>
-              </a:spcAft>
-              <a:buFont typeface="Arial" charset="0"/>
-              <a:buChar char="•"/>
-              <a:defRPr/>
-            </a:pPr>
-            <a:r>
-              <a:rPr lang="en-US" sz="2800" dirty="0" err="1" smtClean="0"/>
-              <a:t>Numpy</a:t>
-            </a:r>
-            <a:endParaRPr lang="en-US" sz="2800" dirty="0" smtClean="0"/>
-          </a:p>
-          <a:p>
-            <a:pPr marL="742950" lvl="1" indent="-342900">
-              <a:spcAft>
-                <a:spcPts val="1425"/>
-              </a:spcAft>
-              <a:buFont typeface="Arial" charset="0"/>
-              <a:buChar char="•"/>
-              <a:defRPr/>
-            </a:pPr>
-            <a:r>
-              <a:rPr lang="en-US" sz="2800" dirty="0" smtClean="0"/>
-              <a:t>Indexing and Slices</a:t>
-            </a:r>
-          </a:p>
-          <a:p>
-            <a:pPr marL="742950" lvl="1" indent="-342900">
-              <a:spcAft>
-                <a:spcPts val="1425"/>
-              </a:spcAft>
-              <a:buFont typeface="Arial" charset="0"/>
-              <a:buChar char="•"/>
-              <a:defRPr/>
-            </a:pPr>
-            <a:r>
-              <a:rPr lang="en-US" sz="2800" dirty="0" smtClean="0"/>
-              <a:t>Copying</a:t>
             </a:r>
           </a:p>
           <a:p>
@@ -12760,8 +12683,9 @@
             </a:pPr>
             <a:r>
               <a:rPr lang="en-US" sz="2800" dirty="0" smtClean="0"/>
-              <a:t>Loops</a:t>
-            </a:r>
+              <a:t>Loops </a:t>
+            </a:r>
+            <a:endParaRPr lang="en-US" sz="2800" dirty="0" smtClean="0"/>
           </a:p>
           <a:p>
             <a:pPr marL="457200" indent="-457200">
@@ -12787,6 +12711,21 @@
               <a:defRPr/>
             </a:pPr>
             <a:r>
+              <a:rPr lang="en-US" sz="2800" dirty="0" err="1" smtClean="0"/>
+              <a:t>Docstrings</a:t>
+            </a:r>
+            <a:endParaRPr lang="en-US" sz="2800" dirty="0" smtClean="0"/>
+          </a:p>
+          <a:p>
+            <a:pPr marL="857250" lvl="1" indent="-457200">
+              <a:spcAft>
+                <a:spcPts val="1425"/>
+              </a:spcAft>
+              <a:buFont typeface="Arial" charset="0"/>
+              <a:buChar char="•"/>
+              <a:defRPr/>
+            </a:pPr>
+            <a:r>
               <a:rPr lang="en-US" sz="2800" dirty="0" smtClean="0"/>
               <a:t>Catching </a:t>
             </a:r>
@@ -12806,7 +12745,11 @@
             </a:pPr>
             <a:r>
               <a:rPr lang="en-US" sz="2800" dirty="0" smtClean="0"/>
-              <a:t>Example Data Analysis</a:t>
+              <a:t>Exploratory </a:t>
+            </a:r>
+            <a:r>
+              <a:rPr lang="en-US" sz="2800" dirty="0" smtClean="0"/>
+              <a:t>Data Analysis</a:t>
             </a:r>
           </a:p>
           <a:p>
@@ -12820,7 +12763,54 @@
             </a:pPr>
             <a:r>
               <a:rPr lang="en-US" sz="2800" dirty="0" smtClean="0"/>
-              <a:t>Command-line Use</a:t>
+              <a:t>Plotting Graphs</a:t>
+            </a:r>
+          </a:p>
+          <a:p>
+            <a:pPr marL="857250" lvl="1" indent="-457200">
+              <a:spcAft>
+                <a:spcPts val="1425"/>
+              </a:spcAft>
+              <a:buFont typeface="Arial" charset="0"/>
+              <a:buChar char="•"/>
+              <a:defRPr/>
+            </a:pPr>
+            <a:r>
+              <a:rPr lang="en-US" sz="2800" dirty="0" err="1" smtClean="0"/>
+              <a:t>matplotlib</a:t>
+            </a:r>
+            <a:endParaRPr lang="en-US" sz="2800" dirty="0" smtClean="0"/>
+          </a:p>
+          <a:p>
+            <a:pPr marL="457200" indent="-457200">
+              <a:spcAft>
+                <a:spcPts val="1425"/>
+              </a:spcAft>
+              <a:buFont typeface="+mj-lt"/>
+              <a:buAutoNum type="arabicPeriod" startAt="7"/>
+              <a:defRPr/>
+            </a:pPr>
+            <a:r>
+              <a:rPr lang="en-US" sz="2800" dirty="0" smtClean="0"/>
+              <a:t> Exporting &amp; Cleaning Up</a:t>
+            </a:r>
+          </a:p>
+          <a:p>
+            <a:pPr marL="457200" indent="-457200">
+              <a:spcAft>
+                <a:spcPts val="1425"/>
+              </a:spcAft>
+              <a:buFont typeface="+mj-lt"/>
+              <a:buAutoNum type="arabicPeriod" startAt="7"/>
+              <a:defRPr/>
+            </a:pPr>
+            <a:r>
+              <a:rPr lang="en-US" sz="2800" dirty="0" smtClean="0"/>
+              <a:t> Command-line </a:t>
+            </a:r>
+            <a:r>
+              <a:rPr lang="en-US" sz="2800" dirty="0" smtClean="0"/>
+              <a:t>Use</a:t>
             </a:r>
           </a:p>
         </p:txBody>
@@ -12906,14 +12896,14 @@
           <a:effectLst/>
           <a:extLst>
             <a:ext uri="{909E8E84-426E-40dd-AFC4-6F175D3DCCD1}">
-              <a14:hiddenFill xmlns:a14="http://schemas.microsoft.com/office/drawing/2010/main" xmlns="">
+              <a14:hiddenFill xmlns="" xmlns:a14="http://schemas.microsoft.com/office/drawing/2010/main">
                 <a:solidFill>
                   <a:srgbClr val="FFFFFF"/>
                 </a:solidFill>
               </a14:hiddenFill>
             </a:ext>
             <a:ext uri="{91240B29-F687-4f45-9708-019B960494DF}">
-              <a14:hiddenLine xmlns:a14="http://schemas.microsoft.com/office/drawing/2010/main" xmlns="" w="9525" cap="flat">
+              <a14:hiddenLine xmlns="" xmlns:a14="http://schemas.microsoft.com/office/drawing/2010/main" w="9525" cap="flat">
                 <a:solidFill>
                   <a:srgbClr val="3465A4"/>
                 </a:solidFill>
@@ -12923,7 +12913,7 @@
               </a14:hiddenLine>
             </a:ext>
             <a:ext uri="{AF507438-7753-43e0-B8FC-AC1667EBCBE1}">
-              <a14:hiddenEffects xmlns:a14="http://schemas.microsoft.com/office/drawing/2010/main" xmlns="">
+              <a14:hiddenEffects xmlns="" xmlns:a14="http://schemas.microsoft.com/office/drawing/2010/main">
                 <a:effectLst>
                   <a:outerShdw blurRad="63500" dist="38099" dir="2700000" algn="ctr" rotWithShape="0">
                     <a:srgbClr val="000000">
@@ -13303,7 +13293,6 @@
               <a:rPr lang="en-US" sz="4000" dirty="0" smtClean="0"/>
               <a:t>Python — Getting Started</a:t>
             </a:r>
-            <a:endParaRPr lang="en-US" sz="4000" dirty="0" smtClean="0"/>
           </a:p>
         </p:txBody>
       </p:sp>
@@ -13330,14 +13319,14 @@
           <a:effectLst/>
           <a:extLst>
             <a:ext uri="{909E8E84-426E-40dd-AFC4-6F175D3DCCD1}">
-              <a14:hiddenFill xmlns:a14="http://schemas.microsoft.com/office/drawing/2010/main" xmlns="">
+              <a14:hiddenFill xmlns="" xmlns:a14="http://schemas.microsoft.com/office/drawing/2010/main">
                 <a:solidFill>
                   <a:srgbClr val="FFFFFF"/>
                 </a:solidFill>
               </a14:hiddenFill>
             </a:ext>
             <a:ext uri="{91240B29-F687-4f45-9708-019B960494DF}">
-              <a14:hiddenLine xmlns:a14="http://schemas.microsoft.com/office/drawing/2010/main" xmlns="" w="9525" cap="flat">
+              <a14:hiddenLine xmlns="" xmlns:a14="http://schemas.microsoft.com/office/drawing/2010/main" w="9525" cap="flat">
                 <a:solidFill>
                   <a:srgbClr val="3465A4"/>
                 </a:solidFill>
@@ -13347,7 +13336,7 @@
               </a14:hiddenLine>
             </a:ext>
             <a:ext uri="{AF507438-7753-43e0-B8FC-AC1667EBCBE1}">
-              <a14:hiddenEffects xmlns:a14="http://schemas.microsoft.com/office/drawing/2010/main" xmlns="">
+              <a14:hiddenEffects xmlns="" xmlns:a14="http://schemas.microsoft.com/office/drawing/2010/main">
                 <a:effectLst>
                   <a:outerShdw blurRad="63500" dist="38099" dir="2700000" algn="ctr" rotWithShape="0">
                     <a:srgbClr val="000000">
@@ -13726,16 +13715,8 @@
               <a:defRPr/>
             </a:pPr>
             <a:r>
-              <a:rPr lang="en-US" sz="2800" dirty="0" smtClean="0"/>
-              <a:t>Open your console (bash or </a:t>
-            </a:r>
-            <a:r>
-              <a:rPr lang="en-US" sz="2800" dirty="0" err="1" smtClean="0"/>
-              <a:t>git</a:t>
-            </a:r>
-            <a:r>
-              <a:rPr lang="en-US" sz="2800" dirty="0" smtClean="0"/>
-              <a:t>-bash) </a:t>
+              <a:rPr lang="en-US" sz="2400" dirty="0"/>
+              <a:t>Open your web browser</a:t>
             </a:r>
           </a:p>
           <a:p>
@@ -13748,8 +13729,20 @@
               <a:defRPr/>
             </a:pPr>
             <a:r>
-              <a:rPr lang="en-US" sz="2800" dirty="0" smtClean="0"/>
-              <a:t>cd to your working directory</a:t>
+              <a:rPr lang="en-US" sz="2400" dirty="0" smtClean="0"/>
+              <a:t>Open </a:t>
+            </a:r>
+            <a:r>
+              <a:rPr lang="en-US" sz="2400" dirty="0" smtClean="0"/>
+              <a:t>your console (bash or </a:t>
+            </a:r>
+            <a:r>
+              <a:rPr lang="en-US" sz="2400" dirty="0" err="1" smtClean="0"/>
+              <a:t>git</a:t>
+            </a:r>
+            <a:r>
+              <a:rPr lang="en-US" sz="2400" dirty="0" smtClean="0"/>
+              <a:t>-bash) </a:t>
             </a:r>
           </a:p>
           <a:p>
@@ -13762,9 +13755,14 @@
               <a:defRPr/>
             </a:pPr>
             <a:r>
-              <a:rPr lang="en-US" sz="2800" dirty="0" smtClean="0"/>
-              <a:t>Open your web browser</a:t>
-            </a:r>
+              <a:rPr lang="en-US" sz="2400" dirty="0" smtClean="0"/>
+              <a:t>cd to your working </a:t>
+            </a:r>
+            <a:r>
+              <a:rPr lang="en-US" sz="2400" dirty="0" smtClean="0"/>
+              <a:t>folder / directory</a:t>
+            </a:r>
+            <a:endParaRPr lang="en-US" sz="2400" dirty="0" smtClean="0"/>
           </a:p>
           <a:p>
             <a:pPr marL="457200" indent="-457200">
@@ -13776,16 +13774,26 @@
               <a:defRPr/>
             </a:pPr>
             <a:r>
-              <a:rPr lang="en-US" sz="2800" dirty="0" smtClean="0"/>
-              <a:t>In console, type “python --version” </a:t>
-            </a:r>
-            <a:r>
-              <a:rPr lang="en-US" sz="2800" dirty="0" smtClean="0">
+              <a:rPr lang="en-US" sz="2400" dirty="0" smtClean="0"/>
+              <a:t>In </a:t>
+            </a:r>
+            <a:r>
+              <a:rPr lang="en-US" sz="2400" dirty="0" smtClean="0"/>
+              <a:t>console, type “python --version” </a:t>
+            </a:r>
+            <a:r>
+              <a:rPr lang="en-US" sz="2400" dirty="0" smtClean="0">
                 <a:sym typeface="Wingdings"/>
               </a:rPr>
-              <a:t> is it v3.5 ?</a:t>
-            </a:r>
-            <a:endParaRPr lang="en-US" sz="2800" dirty="0" smtClean="0"/>
+              <a:t> is it </a:t>
+            </a:r>
+            <a:r>
+              <a:rPr lang="en-US" sz="2400" dirty="0" smtClean="0">
+                <a:sym typeface="Wingdings"/>
+              </a:rPr>
+              <a:t>v3.5.x?</a:t>
+            </a:r>
+            <a:endParaRPr lang="en-US" sz="2400" dirty="0" smtClean="0"/>
           </a:p>
           <a:p>
             <a:pPr marL="457200" indent="-457200">
@@ -13797,15 +13805,15 @@
               <a:defRPr/>
             </a:pPr>
             <a:r>
-              <a:rPr lang="en-US" sz="2800" dirty="0" smtClean="0"/>
+              <a:rPr lang="en-US" sz="2400" dirty="0" smtClean="0"/>
               <a:t>In console, type “</a:t>
             </a:r>
             <a:r>
-              <a:rPr lang="en-US" sz="2800" dirty="0" err="1" smtClean="0"/>
+              <a:rPr lang="en-US" sz="2400" dirty="0" err="1" smtClean="0"/>
               <a:t>jupyter</a:t>
             </a:r>
             <a:r>
-              <a:rPr lang="en-US" sz="2800" dirty="0" smtClean="0"/>
+              <a:rPr lang="en-US" sz="2400" dirty="0" smtClean="0"/>
               <a:t> notebook”</a:t>
             </a:r>
           </a:p>
@@ -13817,16 +13825,32 @@
               <a:defRPr/>
             </a:pPr>
             <a:r>
-              <a:rPr lang="en-US" sz="2800" dirty="0" smtClean="0">
+              <a:rPr lang="en-US" sz="2400" dirty="0" smtClean="0">
                 <a:sym typeface="Wingdings"/>
               </a:rPr>
               <a:t> </a:t>
             </a:r>
             <a:r>
-              <a:rPr lang="en-US" sz="2800" dirty="0" smtClean="0"/>
-              <a:t>Opens a new browser tab</a:t>
-            </a:r>
-            <a:endParaRPr lang="en-US" sz="2800" dirty="0"/>
+              <a:rPr lang="en-US" sz="2400" dirty="0" smtClean="0"/>
+              <a:t>Spawns </a:t>
+            </a:r>
+            <a:r>
+              <a:rPr lang="en-US" sz="2400" dirty="0" smtClean="0"/>
+              <a:t>a new </a:t>
+            </a:r>
+            <a:r>
+              <a:rPr lang="en-US" sz="2400" dirty="0" smtClean="0"/>
+              <a:t>browser tab with </a:t>
+            </a:r>
+            <a:r>
+              <a:rPr lang="en-US" sz="2400" dirty="0" err="1" smtClean="0"/>
+              <a:t>jupyter</a:t>
+            </a:r>
+            <a:r>
+              <a:rPr lang="en-US" sz="2400" dirty="0" smtClean="0"/>
+              <a:t> page</a:t>
+            </a:r>
+            <a:endParaRPr lang="en-US" sz="2400" dirty="0"/>
           </a:p>
           <a:p>
             <a:pPr marL="457200" indent="-457200">
@@ -13838,16 +13862,30 @@
               <a:defRPr/>
             </a:pPr>
             <a:r>
-              <a:rPr lang="en-US" sz="2800" dirty="0" smtClean="0"/>
-              <a:t>At upper right click “New” </a:t>
-            </a:r>
-            <a:r>
-              <a:rPr lang="en-US" sz="2800" dirty="0" smtClean="0">
+              <a:rPr lang="en-US" sz="2400" dirty="0" smtClean="0"/>
+              <a:t>At upper right </a:t>
+            </a:r>
+            <a:r>
+              <a:rPr lang="en-US" sz="2400" dirty="0" smtClean="0"/>
+              <a:t>of browser page click </a:t>
+            </a:r>
+            <a:r>
+              <a:rPr lang="en-US" sz="2400" dirty="0" smtClean="0"/>
+              <a:t>“New” </a:t>
+            </a:r>
+            <a:r>
+              <a:rPr lang="en-US" sz="2400" dirty="0" smtClean="0">
                 <a:sym typeface="Wingdings"/>
               </a:rPr>
-              <a:t> “Python 3”</a:t>
-            </a:r>
-            <a:endParaRPr lang="en-US" sz="2800" dirty="0">
+              <a:t> “Python 3</a:t>
+            </a:r>
+            <a:r>
+              <a:rPr lang="en-US" sz="2400" dirty="0" smtClean="0">
+                <a:sym typeface="Wingdings"/>
+              </a:rPr>
+              <a:t>”</a:t>
+            </a:r>
+            <a:endParaRPr lang="en-US" sz="2400" dirty="0" smtClean="0">
               <a:sym typeface="Wingdings"/>
             </a:endParaRPr>
           </a:p>
@@ -13858,9 +13896,24 @@
               </a:spcAft>
               <a:defRPr/>
             </a:pPr>
-            <a:endParaRPr lang="en-US" sz="1200" dirty="0" smtClean="0">
-              <a:sym typeface="Wingdings"/>
-            </a:endParaRPr>
+            <a:r>
+              <a:rPr lang="en-US" sz="2400" dirty="0" smtClean="0">
+                <a:sym typeface="Wingdings"/>
+              </a:rPr>
+              <a:t>When </a:t>
+            </a:r>
+            <a:r>
+              <a:rPr lang="en-US" sz="2400" dirty="0" smtClean="0">
+                <a:sym typeface="Wingdings"/>
+              </a:rPr>
+              <a:t>done with a notebook tab, </a:t>
+            </a:r>
+            <a:r>
+              <a:rPr lang="en-US" sz="2400" dirty="0" smtClean="0">
+                <a:sym typeface="Wingdings"/>
+              </a:rPr>
+              <a:t>don’t just X out of the browser tab!</a:t>
+            </a:r>
           </a:p>
           <a:p>
             <a:pPr marL="0" indent="0">
@@ -13870,10 +13923,22 @@
               <a:defRPr/>
             </a:pPr>
             <a:r>
-              <a:rPr lang="en-US" sz="2800" dirty="0" smtClean="0">
+              <a:rPr lang="en-US" sz="2400" dirty="0">
                 <a:sym typeface="Wingdings"/>
               </a:rPr>
-              <a:t>When done, don’t just X out of the browser tab!</a:t>
+              <a:t>	</a:t>
+            </a:r>
+            <a:r>
+              <a:rPr lang="en-US" sz="2400" dirty="0" smtClean="0">
+                <a:sym typeface="Wingdings"/>
+              </a:rPr>
+              <a:t>Click “File”  “Close and Halt</a:t>
+            </a:r>
+            <a:r>
+              <a:rPr lang="en-US" sz="2400" dirty="0" smtClean="0">
+                <a:sym typeface="Wingdings"/>
+              </a:rPr>
+              <a:t>”</a:t>
             </a:r>
           </a:p>
           <a:p>
@@ -13884,17 +13949,26 @@
               <a:defRPr/>
             </a:pPr>
             <a:r>
-              <a:rPr lang="en-US" sz="2800" dirty="0">
+              <a:rPr lang="en-US" sz="2400" dirty="0" smtClean="0">
                 <a:sym typeface="Wingdings"/>
               </a:rPr>
-              <a:t>	</a:t>
-            </a:r>
-            <a:r>
-              <a:rPr lang="en-US" sz="2800" dirty="0" smtClean="0">
+              <a:t>When done with the </a:t>
+            </a:r>
+            <a:r>
+              <a:rPr lang="en-US" sz="2400" dirty="0" err="1" smtClean="0">
                 <a:sym typeface="Wingdings"/>
               </a:rPr>
-              <a:t>Click “File”  “Close and Halt”</a:t>
-            </a:r>
+              <a:t>jupyter</a:t>
+            </a:r>
+            <a:r>
+              <a:rPr lang="en-US" sz="2400" dirty="0" smtClean="0">
+                <a:sym typeface="Wingdings"/>
+              </a:rPr>
+              <a:t> page  X out  console  &lt;ctrl-C&gt; </a:t>
+            </a:r>
+            <a:endParaRPr lang="en-US" sz="2400" dirty="0" smtClean="0">
+              <a:sym typeface="Wingdings"/>
+            </a:endParaRPr>
           </a:p>
         </p:txBody>
       </p:sp>
@@ -14185,7 +14259,7 @@
         <a:effectLst/>
         <a:extLst>
           <a:ext uri="{AF507438-7753-43e0-B8FC-AC1667EBCBE1}">
-            <a14:hiddenEffects xmlns:a14="http://schemas.microsoft.com/office/drawing/2010/main" xmlns="">
+            <a14:hiddenEffects xmlns="" xmlns:a14="http://schemas.microsoft.com/office/drawing/2010/main">
               <a:effectLst>
                 <a:outerShdw blurRad="63500" dist="38099" dir="2700000" algn="ctr" rotWithShape="0">
                   <a:schemeClr val="bg2">
@@ -14264,7 +14338,7 @@
         <a:effectLst/>
         <a:extLst>
           <a:ext uri="{AF507438-7753-43e0-B8FC-AC1667EBCBE1}">
-            <a14:hiddenEffects xmlns:a14="http://schemas.microsoft.com/office/drawing/2010/main" xmlns="">
+            <a14:hiddenEffects xmlns="" xmlns:a14="http://schemas.microsoft.com/office/drawing/2010/main">
               <a:effectLst>
                 <a:outerShdw blurRad="63500" dist="38099" dir="2700000" algn="ctr" rotWithShape="0">
                   <a:schemeClr val="bg2">

</xml_diff>